<commit_message>
Presentación y correcciones memoria
</commit_message>
<xml_diff>
--- a/memoria/Presentacion.pptx
+++ b/memoria/Presentacion.pptx
@@ -8,10 +8,23 @@
     <p:sldId id="256" r:id="rId2"/>
     <p:sldId id="257" r:id="rId3"/>
     <p:sldId id="258" r:id="rId4"/>
-    <p:sldId id="259" r:id="rId5"/>
-    <p:sldId id="260" r:id="rId6"/>
-    <p:sldId id="261" r:id="rId7"/>
-    <p:sldId id="262" r:id="rId8"/>
+    <p:sldId id="263" r:id="rId5"/>
+    <p:sldId id="259" r:id="rId6"/>
+    <p:sldId id="260" r:id="rId7"/>
+    <p:sldId id="261" r:id="rId8"/>
+    <p:sldId id="262" r:id="rId9"/>
+    <p:sldId id="264" r:id="rId10"/>
+    <p:sldId id="265" r:id="rId11"/>
+    <p:sldId id="266" r:id="rId12"/>
+    <p:sldId id="267" r:id="rId13"/>
+    <p:sldId id="268" r:id="rId14"/>
+    <p:sldId id="269" r:id="rId15"/>
+    <p:sldId id="270" r:id="rId16"/>
+    <p:sldId id="271" r:id="rId17"/>
+    <p:sldId id="272" r:id="rId18"/>
+    <p:sldId id="273" r:id="rId19"/>
+    <p:sldId id="274" r:id="rId20"/>
+    <p:sldId id="275" r:id="rId21"/>
   </p:sldIdLst>
   <p:sldSz cx="12192000" cy="6858000"/>
   <p:notesSz cx="6858000" cy="9144000"/>
@@ -4109,7 +4122,7 @@
           <a:p>
             <a:fld id="{DED9D05C-6E66-4736-88C6-567C08E30FFA}" type="datetimeFigureOut">
               <a:rPr lang="es-ES" smtClean="0"/>
-              <a:t>23/05/2021</a:t>
+              <a:t>26/05/2021</a:t>
             </a:fld>
             <a:endParaRPr lang="es-ES"/>
           </a:p>
@@ -5197,7 +5210,7 @@
           <a:p>
             <a:fld id="{DED9D05C-6E66-4736-88C6-567C08E30FFA}" type="datetimeFigureOut">
               <a:rPr lang="es-ES" smtClean="0"/>
-              <a:t>23/05/2021</a:t>
+              <a:t>26/05/2021</a:t>
             </a:fld>
             <a:endParaRPr lang="es-ES"/>
           </a:p>
@@ -6177,7 +6190,7 @@
           <a:p>
             <a:fld id="{DED9D05C-6E66-4736-88C6-567C08E30FFA}" type="datetimeFigureOut">
               <a:rPr lang="es-ES" smtClean="0"/>
-              <a:t>23/05/2021</a:t>
+              <a:t>26/05/2021</a:t>
             </a:fld>
             <a:endParaRPr lang="es-ES"/>
           </a:p>
@@ -7311,7 +7324,7 @@
           <a:p>
             <a:fld id="{DED9D05C-6E66-4736-88C6-567C08E30FFA}" type="datetimeFigureOut">
               <a:rPr lang="es-ES" smtClean="0"/>
-              <a:t>23/05/2021</a:t>
+              <a:t>26/05/2021</a:t>
             </a:fld>
             <a:endParaRPr lang="es-ES"/>
           </a:p>
@@ -8344,7 +8357,7 @@
           <a:p>
             <a:fld id="{DED9D05C-6E66-4736-88C6-567C08E30FFA}" type="datetimeFigureOut">
               <a:rPr lang="es-ES" smtClean="0"/>
-              <a:t>23/05/2021</a:t>
+              <a:t>26/05/2021</a:t>
             </a:fld>
             <a:endParaRPr lang="es-ES"/>
           </a:p>
@@ -9004,7 +9017,7 @@
           <a:p>
             <a:fld id="{DED9D05C-6E66-4736-88C6-567C08E30FFA}" type="datetimeFigureOut">
               <a:rPr lang="es-ES" smtClean="0"/>
-              <a:t>23/05/2021</a:t>
+              <a:t>26/05/2021</a:t>
             </a:fld>
             <a:endParaRPr lang="es-ES"/>
           </a:p>
@@ -9865,7 +9878,7 @@
           <a:p>
             <a:fld id="{DED9D05C-6E66-4736-88C6-567C08E30FFA}" type="datetimeFigureOut">
               <a:rPr lang="es-ES" smtClean="0"/>
-              <a:t>23/05/2021</a:t>
+              <a:t>26/05/2021</a:t>
             </a:fld>
             <a:endParaRPr lang="es-ES"/>
           </a:p>
@@ -10055,7 +10068,7 @@
           <a:p>
             <a:fld id="{DED9D05C-6E66-4736-88C6-567C08E30FFA}" type="datetimeFigureOut">
               <a:rPr lang="es-ES" smtClean="0"/>
-              <a:t>23/05/2021</a:t>
+              <a:t>26/05/2021</a:t>
             </a:fld>
             <a:endParaRPr lang="es-ES"/>
           </a:p>
@@ -11027,7 +11040,7 @@
           <a:p>
             <a:fld id="{DED9D05C-6E66-4736-88C6-567C08E30FFA}" type="datetimeFigureOut">
               <a:rPr lang="es-ES" smtClean="0"/>
-              <a:t>23/05/2021</a:t>
+              <a:t>26/05/2021</a:t>
             </a:fld>
             <a:endParaRPr lang="es-ES"/>
           </a:p>
@@ -11238,7 +11251,7 @@
           <a:p>
             <a:fld id="{DED9D05C-6E66-4736-88C6-567C08E30FFA}" type="datetimeFigureOut">
               <a:rPr lang="es-ES" smtClean="0"/>
-              <a:t>23/05/2021</a:t>
+              <a:t>26/05/2021</a:t>
             </a:fld>
             <a:endParaRPr lang="es-ES"/>
           </a:p>
@@ -12272,7 +12285,7 @@
           <a:p>
             <a:fld id="{DED9D05C-6E66-4736-88C6-567C08E30FFA}" type="datetimeFigureOut">
               <a:rPr lang="es-ES" smtClean="0"/>
-              <a:t>23/05/2021</a:t>
+              <a:t>26/05/2021</a:t>
             </a:fld>
             <a:endParaRPr lang="es-ES"/>
           </a:p>
@@ -12544,7 +12557,7 @@
           <a:p>
             <a:fld id="{DED9D05C-6E66-4736-88C6-567C08E30FFA}" type="datetimeFigureOut">
               <a:rPr lang="es-ES" smtClean="0"/>
-              <a:t>23/05/2021</a:t>
+              <a:t>26/05/2021</a:t>
             </a:fld>
             <a:endParaRPr lang="es-ES"/>
           </a:p>
@@ -12954,7 +12967,7 @@
           <a:p>
             <a:fld id="{DED9D05C-6E66-4736-88C6-567C08E30FFA}" type="datetimeFigureOut">
               <a:rPr lang="es-ES" smtClean="0"/>
-              <a:t>23/05/2021</a:t>
+              <a:t>26/05/2021</a:t>
             </a:fld>
             <a:endParaRPr lang="es-ES"/>
           </a:p>
@@ -13081,7 +13094,7 @@
           <a:p>
             <a:fld id="{DED9D05C-6E66-4736-88C6-567C08E30FFA}" type="datetimeFigureOut">
               <a:rPr lang="es-ES" smtClean="0"/>
-              <a:t>23/05/2021</a:t>
+              <a:t>26/05/2021</a:t>
             </a:fld>
             <a:endParaRPr lang="es-ES"/>
           </a:p>
@@ -13176,7 +13189,7 @@
           <a:p>
             <a:fld id="{DED9D05C-6E66-4736-88C6-567C08E30FFA}" type="datetimeFigureOut">
               <a:rPr lang="es-ES" smtClean="0"/>
-              <a:t>23/05/2021</a:t>
+              <a:t>26/05/2021</a:t>
             </a:fld>
             <a:endParaRPr lang="es-ES"/>
           </a:p>
@@ -14257,7 +14270,7 @@
           <a:p>
             <a:fld id="{DED9D05C-6E66-4736-88C6-567C08E30FFA}" type="datetimeFigureOut">
               <a:rPr lang="es-ES" smtClean="0"/>
-              <a:t>23/05/2021</a:t>
+              <a:t>26/05/2021</a:t>
             </a:fld>
             <a:endParaRPr lang="es-ES"/>
           </a:p>
@@ -15365,7 +15378,7 @@
           <a:p>
             <a:fld id="{DED9D05C-6E66-4736-88C6-567C08E30FFA}" type="datetimeFigureOut">
               <a:rPr lang="es-ES" smtClean="0"/>
-              <a:t>23/05/2021</a:t>
+              <a:t>26/05/2021</a:t>
             </a:fld>
             <a:endParaRPr lang="es-ES"/>
           </a:p>
@@ -16362,7 +16375,7 @@
           <a:p>
             <a:fld id="{DED9D05C-6E66-4736-88C6-567C08E30FFA}" type="datetimeFigureOut">
               <a:rPr lang="es-ES" smtClean="0"/>
-              <a:t>23/05/2021</a:t>
+              <a:t>26/05/2021</a:t>
             </a:fld>
             <a:endParaRPr lang="es-ES"/>
           </a:p>
@@ -17059,6 +17072,1724 @@
 </p:sld>
 </file>
 
+<file path=ppt/slides/slide10.xml><?xml version="1.0" encoding="utf-8"?>
+<p:sld xmlns:a="http://schemas.openxmlformats.org/drawingml/2006/main" xmlns:r="http://schemas.openxmlformats.org/officeDocument/2006/relationships" xmlns:p="http://schemas.openxmlformats.org/presentationml/2006/main">
+  <p:cSld>
+    <p:spTree>
+      <p:nvGrpSpPr>
+        <p:cNvPr id="1" name=""/>
+        <p:cNvGrpSpPr/>
+        <p:nvPr/>
+      </p:nvGrpSpPr>
+      <p:grpSpPr>
+        <a:xfrm>
+          <a:off x="0" y="0"/>
+          <a:ext cx="0" cy="0"/>
+          <a:chOff x="0" y="0"/>
+          <a:chExt cx="0" cy="0"/>
+        </a:xfrm>
+      </p:grpSpPr>
+      <p:sp>
+        <p:nvSpPr>
+          <p:cNvPr id="2" name="Título 1">
+            <a:extLst>
+              <a:ext uri="{FF2B5EF4-FFF2-40B4-BE49-F238E27FC236}">
+                <a16:creationId xmlns:a16="http://schemas.microsoft.com/office/drawing/2014/main" id="{9568156F-1E0A-4E4A-A17C-51BFE1AB8467}"/>
+              </a:ext>
+            </a:extLst>
+          </p:cNvPr>
+          <p:cNvSpPr>
+            <a:spLocks noGrp="1"/>
+          </p:cNvSpPr>
+          <p:nvPr>
+            <p:ph type="title"/>
+          </p:nvPr>
+        </p:nvSpPr>
+        <p:spPr/>
+        <p:txBody>
+          <a:bodyPr/>
+          <a:lstStyle/>
+          <a:p>
+            <a:r>
+              <a:rPr lang="es-ES" dirty="0"/>
+              <a:t>Introducción a la práctica</a:t>
+            </a:r>
+          </a:p>
+        </p:txBody>
+      </p:sp>
+      <p:pic>
+        <p:nvPicPr>
+          <p:cNvPr id="5" name="Marcador de contenido 4">
+            <a:extLst>
+              <a:ext uri="{FF2B5EF4-FFF2-40B4-BE49-F238E27FC236}">
+                <a16:creationId xmlns:a16="http://schemas.microsoft.com/office/drawing/2014/main" id="{8ADC3885-F97D-4206-91DE-2D3CA7FE4BB6}"/>
+              </a:ext>
+            </a:extLst>
+          </p:cNvPr>
+          <p:cNvPicPr>
+            <a:picLocks noGrp="1" noChangeAspect="1"/>
+          </p:cNvPicPr>
+          <p:nvPr>
+            <p:ph idx="1"/>
+          </p:nvPr>
+        </p:nvPicPr>
+        <p:blipFill>
+          <a:blip r:embed="rId2"/>
+          <a:stretch>
+            <a:fillRect/>
+          </a:stretch>
+        </p:blipFill>
+        <p:spPr>
+          <a:xfrm>
+            <a:off x="983468" y="2681546"/>
+            <a:ext cx="10225063" cy="3777467"/>
+          </a:xfrm>
+        </p:spPr>
+      </p:pic>
+    </p:spTree>
+    <p:extLst>
+      <p:ext uri="{BB962C8B-B14F-4D97-AF65-F5344CB8AC3E}">
+        <p14:creationId xmlns:p14="http://schemas.microsoft.com/office/powerpoint/2010/main" val="2098905039"/>
+      </p:ext>
+    </p:extLst>
+  </p:cSld>
+  <p:clrMapOvr>
+    <a:masterClrMapping/>
+  </p:clrMapOvr>
+</p:sld>
+</file>
+
+<file path=ppt/slides/slide11.xml><?xml version="1.0" encoding="utf-8"?>
+<p:sld xmlns:a="http://schemas.openxmlformats.org/drawingml/2006/main" xmlns:r="http://schemas.openxmlformats.org/officeDocument/2006/relationships" xmlns:p="http://schemas.openxmlformats.org/presentationml/2006/main">
+  <p:cSld>
+    <p:spTree>
+      <p:nvGrpSpPr>
+        <p:cNvPr id="1" name=""/>
+        <p:cNvGrpSpPr/>
+        <p:nvPr/>
+      </p:nvGrpSpPr>
+      <p:grpSpPr>
+        <a:xfrm>
+          <a:off x="0" y="0"/>
+          <a:ext cx="0" cy="0"/>
+          <a:chOff x="0" y="0"/>
+          <a:chExt cx="0" cy="0"/>
+        </a:xfrm>
+      </p:grpSpPr>
+      <p:sp>
+        <p:nvSpPr>
+          <p:cNvPr id="2" name="Título 1">
+            <a:extLst>
+              <a:ext uri="{FF2B5EF4-FFF2-40B4-BE49-F238E27FC236}">
+                <a16:creationId xmlns:a16="http://schemas.microsoft.com/office/drawing/2014/main" id="{8FE15827-D526-4EBE-9506-EC3DC4616E98}"/>
+              </a:ext>
+            </a:extLst>
+          </p:cNvPr>
+          <p:cNvSpPr>
+            <a:spLocks noGrp="1"/>
+          </p:cNvSpPr>
+          <p:nvPr>
+            <p:ph type="title"/>
+          </p:nvPr>
+        </p:nvSpPr>
+        <p:spPr/>
+        <p:txBody>
+          <a:bodyPr/>
+          <a:lstStyle/>
+          <a:p>
+            <a:r>
+              <a:rPr lang="es-ES"/>
+              <a:t>Introducción: Análisis e histograma</a:t>
+            </a:r>
+            <a:endParaRPr lang="es-ES" dirty="0"/>
+          </a:p>
+        </p:txBody>
+      </p:sp>
+      <p:sp>
+        <p:nvSpPr>
+          <p:cNvPr id="3" name="Marcador de contenido 2">
+            <a:extLst>
+              <a:ext uri="{FF2B5EF4-FFF2-40B4-BE49-F238E27FC236}">
+                <a16:creationId xmlns:a16="http://schemas.microsoft.com/office/drawing/2014/main" id="{45F512F5-3FA1-4ABA-9C75-6C41C4FA2845}"/>
+              </a:ext>
+            </a:extLst>
+          </p:cNvPr>
+          <p:cNvSpPr>
+            <a:spLocks noGrp="1"/>
+          </p:cNvSpPr>
+          <p:nvPr>
+            <p:ph idx="1"/>
+          </p:nvPr>
+        </p:nvSpPr>
+        <p:spPr>
+          <a:xfrm>
+            <a:off x="1154955" y="2603500"/>
+            <a:ext cx="3951618" cy="3416300"/>
+          </a:xfrm>
+        </p:spPr>
+        <p:txBody>
+          <a:bodyPr/>
+          <a:lstStyle/>
+          <a:p>
+            <a:r>
+              <a:rPr lang="es-ES"/>
+              <a:t>Se invita a inspeccionar la imagen</a:t>
+            </a:r>
+          </a:p>
+          <a:p>
+            <a:r>
+              <a:rPr lang="es-ES"/>
+              <a:t>Uso de histograma en prácticas anteriores</a:t>
+            </a:r>
+            <a:endParaRPr lang="es-ES" dirty="0"/>
+          </a:p>
+        </p:txBody>
+      </p:sp>
+      <p:pic>
+        <p:nvPicPr>
+          <p:cNvPr id="5" name="Imagen 4">
+            <a:extLst>
+              <a:ext uri="{FF2B5EF4-FFF2-40B4-BE49-F238E27FC236}">
+                <a16:creationId xmlns:a16="http://schemas.microsoft.com/office/drawing/2014/main" id="{2786148E-D3A7-471B-A910-964B096CB301}"/>
+              </a:ext>
+            </a:extLst>
+          </p:cNvPr>
+          <p:cNvPicPr>
+            <a:picLocks noChangeAspect="1"/>
+          </p:cNvPicPr>
+          <p:nvPr/>
+        </p:nvPicPr>
+        <p:blipFill>
+          <a:blip r:embed="rId2"/>
+          <a:stretch>
+            <a:fillRect/>
+          </a:stretch>
+        </p:blipFill>
+        <p:spPr>
+          <a:xfrm>
+            <a:off x="957080" y="4058093"/>
+            <a:ext cx="7228977" cy="2575842"/>
+          </a:xfrm>
+          <a:prstGeom prst="rect">
+            <a:avLst/>
+          </a:prstGeom>
+        </p:spPr>
+      </p:pic>
+      <p:pic>
+        <p:nvPicPr>
+          <p:cNvPr id="7" name="Imagen 6">
+            <a:extLst>
+              <a:ext uri="{FF2B5EF4-FFF2-40B4-BE49-F238E27FC236}">
+                <a16:creationId xmlns:a16="http://schemas.microsoft.com/office/drawing/2014/main" id="{90F266E4-D9E8-448D-B649-10F2548CE26A}"/>
+              </a:ext>
+            </a:extLst>
+          </p:cNvPr>
+          <p:cNvPicPr>
+            <a:picLocks noChangeAspect="1"/>
+          </p:cNvPicPr>
+          <p:nvPr/>
+        </p:nvPicPr>
+        <p:blipFill>
+          <a:blip r:embed="rId3"/>
+          <a:stretch>
+            <a:fillRect/>
+          </a:stretch>
+        </p:blipFill>
+        <p:spPr>
+          <a:xfrm>
+            <a:off x="8592457" y="2265781"/>
+            <a:ext cx="3094945" cy="2326437"/>
+          </a:xfrm>
+          <a:prstGeom prst="rect">
+            <a:avLst/>
+          </a:prstGeom>
+        </p:spPr>
+      </p:pic>
+    </p:spTree>
+    <p:extLst>
+      <p:ext uri="{BB962C8B-B14F-4D97-AF65-F5344CB8AC3E}">
+        <p14:creationId xmlns:p14="http://schemas.microsoft.com/office/powerpoint/2010/main" val="4099212339"/>
+      </p:ext>
+    </p:extLst>
+  </p:cSld>
+  <p:clrMapOvr>
+    <a:masterClrMapping/>
+  </p:clrMapOvr>
+</p:sld>
+</file>
+
+<file path=ppt/slides/slide12.xml><?xml version="1.0" encoding="utf-8"?>
+<p:sld xmlns:a="http://schemas.openxmlformats.org/drawingml/2006/main" xmlns:r="http://schemas.openxmlformats.org/officeDocument/2006/relationships" xmlns:p="http://schemas.openxmlformats.org/presentationml/2006/main">
+  <p:cSld>
+    <p:spTree>
+      <p:nvGrpSpPr>
+        <p:cNvPr id="1" name=""/>
+        <p:cNvGrpSpPr/>
+        <p:nvPr/>
+      </p:nvGrpSpPr>
+      <p:grpSpPr>
+        <a:xfrm>
+          <a:off x="0" y="0"/>
+          <a:ext cx="0" cy="0"/>
+          <a:chOff x="0" y="0"/>
+          <a:chExt cx="0" cy="0"/>
+        </a:xfrm>
+      </p:grpSpPr>
+      <p:sp>
+        <p:nvSpPr>
+          <p:cNvPr id="2" name="Título 1">
+            <a:extLst>
+              <a:ext uri="{FF2B5EF4-FFF2-40B4-BE49-F238E27FC236}">
+                <a16:creationId xmlns:a16="http://schemas.microsoft.com/office/drawing/2014/main" id="{71D3CF6C-0F6C-4652-A21B-B062A9F1447C}"/>
+              </a:ext>
+            </a:extLst>
+          </p:cNvPr>
+          <p:cNvSpPr>
+            <a:spLocks noGrp="1"/>
+          </p:cNvSpPr>
+          <p:nvPr>
+            <p:ph type="title"/>
+          </p:nvPr>
+        </p:nvSpPr>
+        <p:spPr/>
+        <p:txBody>
+          <a:bodyPr/>
+          <a:lstStyle/>
+          <a:p>
+            <a:r>
+              <a:rPr lang="es-ES" dirty="0"/>
+              <a:t>Apartado 1: RGB</a:t>
+            </a:r>
+          </a:p>
+        </p:txBody>
+      </p:sp>
+      <p:sp>
+        <p:nvSpPr>
+          <p:cNvPr id="3" name="Marcador de contenido 2">
+            <a:extLst>
+              <a:ext uri="{FF2B5EF4-FFF2-40B4-BE49-F238E27FC236}">
+                <a16:creationId xmlns:a16="http://schemas.microsoft.com/office/drawing/2014/main" id="{58DF7B4A-3A6B-4C42-ABBF-D346C8D62641}"/>
+              </a:ext>
+            </a:extLst>
+          </p:cNvPr>
+          <p:cNvSpPr>
+            <a:spLocks noGrp="1"/>
+          </p:cNvSpPr>
+          <p:nvPr>
+            <p:ph idx="1"/>
+          </p:nvPr>
+        </p:nvSpPr>
+        <p:spPr>
+          <a:xfrm>
+            <a:off x="1154954" y="2470207"/>
+            <a:ext cx="8825659" cy="3549593"/>
+          </a:xfrm>
+        </p:spPr>
+        <p:txBody>
+          <a:bodyPr/>
+          <a:lstStyle/>
+          <a:p>
+            <a:r>
+              <a:rPr lang="es-ES" dirty="0"/>
+              <a:t>K-medias con las características de color RGB</a:t>
+            </a:r>
+          </a:p>
+        </p:txBody>
+      </p:sp>
+      <p:pic>
+        <p:nvPicPr>
+          <p:cNvPr id="5" name="Imagen 4">
+            <a:extLst>
+              <a:ext uri="{FF2B5EF4-FFF2-40B4-BE49-F238E27FC236}">
+                <a16:creationId xmlns:a16="http://schemas.microsoft.com/office/drawing/2014/main" id="{77CD8F1C-2A1D-4CA7-8E66-28173943533B}"/>
+              </a:ext>
+            </a:extLst>
+          </p:cNvPr>
+          <p:cNvPicPr>
+            <a:picLocks noChangeAspect="1"/>
+          </p:cNvPicPr>
+          <p:nvPr/>
+        </p:nvPicPr>
+        <p:blipFill>
+          <a:blip r:embed="rId2"/>
+          <a:stretch>
+            <a:fillRect/>
+          </a:stretch>
+        </p:blipFill>
+        <p:spPr>
+          <a:xfrm>
+            <a:off x="1811191" y="2950536"/>
+            <a:ext cx="8569617" cy="3549593"/>
+          </a:xfrm>
+          <a:prstGeom prst="rect">
+            <a:avLst/>
+          </a:prstGeom>
+        </p:spPr>
+      </p:pic>
+    </p:spTree>
+    <p:extLst>
+      <p:ext uri="{BB962C8B-B14F-4D97-AF65-F5344CB8AC3E}">
+        <p14:creationId xmlns:p14="http://schemas.microsoft.com/office/powerpoint/2010/main" val="1086530905"/>
+      </p:ext>
+    </p:extLst>
+  </p:cSld>
+  <p:clrMapOvr>
+    <a:masterClrMapping/>
+  </p:clrMapOvr>
+</p:sld>
+</file>
+
+<file path=ppt/slides/slide13.xml><?xml version="1.0" encoding="utf-8"?>
+<p:sld xmlns:a="http://schemas.openxmlformats.org/drawingml/2006/main" xmlns:r="http://schemas.openxmlformats.org/officeDocument/2006/relationships" xmlns:p="http://schemas.openxmlformats.org/presentationml/2006/main">
+  <p:cSld>
+    <p:spTree>
+      <p:nvGrpSpPr>
+        <p:cNvPr id="1" name=""/>
+        <p:cNvGrpSpPr/>
+        <p:nvPr/>
+      </p:nvGrpSpPr>
+      <p:grpSpPr>
+        <a:xfrm>
+          <a:off x="0" y="0"/>
+          <a:ext cx="0" cy="0"/>
+          <a:chOff x="0" y="0"/>
+          <a:chExt cx="0" cy="0"/>
+        </a:xfrm>
+      </p:grpSpPr>
+      <p:sp>
+        <p:nvSpPr>
+          <p:cNvPr id="2" name="Título 1">
+            <a:extLst>
+              <a:ext uri="{FF2B5EF4-FFF2-40B4-BE49-F238E27FC236}">
+                <a16:creationId xmlns:a16="http://schemas.microsoft.com/office/drawing/2014/main" id="{97F89D66-444C-4C1E-8F78-D8C8A0DA9464}"/>
+              </a:ext>
+            </a:extLst>
+          </p:cNvPr>
+          <p:cNvSpPr>
+            <a:spLocks noGrp="1"/>
+          </p:cNvSpPr>
+          <p:nvPr>
+            <p:ph type="title"/>
+          </p:nvPr>
+        </p:nvSpPr>
+        <p:spPr/>
+        <p:txBody>
+          <a:bodyPr/>
+          <a:lstStyle/>
+          <a:p>
+            <a:r>
+              <a:rPr lang="es-ES" dirty="0"/>
+              <a:t>Apartado 1: Resultados</a:t>
+            </a:r>
+          </a:p>
+        </p:txBody>
+      </p:sp>
+      <p:pic>
+        <p:nvPicPr>
+          <p:cNvPr id="5" name="Marcador de contenido 4">
+            <a:extLst>
+              <a:ext uri="{FF2B5EF4-FFF2-40B4-BE49-F238E27FC236}">
+                <a16:creationId xmlns:a16="http://schemas.microsoft.com/office/drawing/2014/main" id="{03DE1C51-AEC1-420B-86A0-A0F7924E72E3}"/>
+              </a:ext>
+            </a:extLst>
+          </p:cNvPr>
+          <p:cNvPicPr>
+            <a:picLocks noGrp="1" noChangeAspect="1"/>
+          </p:cNvPicPr>
+          <p:nvPr>
+            <p:ph idx="1"/>
+          </p:nvPr>
+        </p:nvPicPr>
+        <p:blipFill>
+          <a:blip r:embed="rId2">
+            <a:extLst>
+              <a:ext uri="{28A0092B-C50C-407E-A947-70E740481C1C}">
+                <a14:useLocalDpi xmlns:a14="http://schemas.microsoft.com/office/drawing/2010/main" val="0"/>
+              </a:ext>
+            </a:extLst>
+          </a:blip>
+          <a:stretch>
+            <a:fillRect/>
+          </a:stretch>
+        </p:blipFill>
+        <p:spPr>
+          <a:xfrm>
+            <a:off x="1547097" y="2563346"/>
+            <a:ext cx="3683292" cy="3824957"/>
+          </a:xfrm>
+        </p:spPr>
+      </p:pic>
+      <p:pic>
+        <p:nvPicPr>
+          <p:cNvPr id="7" name="Imagen 6" descr="Mapa&#10;&#10;Descripción generada automáticamente">
+            <a:extLst>
+              <a:ext uri="{FF2B5EF4-FFF2-40B4-BE49-F238E27FC236}">
+                <a16:creationId xmlns:a16="http://schemas.microsoft.com/office/drawing/2014/main" id="{55FAAF70-C2C0-4E66-A780-833748B0936B}"/>
+              </a:ext>
+            </a:extLst>
+          </p:cNvPr>
+          <p:cNvPicPr>
+            <a:picLocks noChangeAspect="1"/>
+          </p:cNvPicPr>
+          <p:nvPr/>
+        </p:nvPicPr>
+        <p:blipFill>
+          <a:blip r:embed="rId3">
+            <a:extLst>
+              <a:ext uri="{28A0092B-C50C-407E-A947-70E740481C1C}">
+                <a14:useLocalDpi xmlns:a14="http://schemas.microsoft.com/office/drawing/2010/main" val="0"/>
+              </a:ext>
+            </a:extLst>
+          </a:blip>
+          <a:stretch>
+            <a:fillRect/>
+          </a:stretch>
+        </p:blipFill>
+        <p:spPr>
+          <a:xfrm>
+            <a:off x="7281935" y="2897944"/>
+            <a:ext cx="3362968" cy="3344887"/>
+          </a:xfrm>
+          <a:prstGeom prst="rect">
+            <a:avLst/>
+          </a:prstGeom>
+        </p:spPr>
+      </p:pic>
+    </p:spTree>
+    <p:extLst>
+      <p:ext uri="{BB962C8B-B14F-4D97-AF65-F5344CB8AC3E}">
+        <p14:creationId xmlns:p14="http://schemas.microsoft.com/office/powerpoint/2010/main" val="1463496614"/>
+      </p:ext>
+    </p:extLst>
+  </p:cSld>
+  <p:clrMapOvr>
+    <a:masterClrMapping/>
+  </p:clrMapOvr>
+</p:sld>
+</file>
+
+<file path=ppt/slides/slide14.xml><?xml version="1.0" encoding="utf-8"?>
+<p:sld xmlns:a="http://schemas.openxmlformats.org/drawingml/2006/main" xmlns:r="http://schemas.openxmlformats.org/officeDocument/2006/relationships" xmlns:p="http://schemas.openxmlformats.org/presentationml/2006/main">
+  <p:cSld>
+    <p:spTree>
+      <p:nvGrpSpPr>
+        <p:cNvPr id="1" name=""/>
+        <p:cNvGrpSpPr/>
+        <p:nvPr/>
+      </p:nvGrpSpPr>
+      <p:grpSpPr>
+        <a:xfrm>
+          <a:off x="0" y="0"/>
+          <a:ext cx="0" cy="0"/>
+          <a:chOff x="0" y="0"/>
+          <a:chExt cx="0" cy="0"/>
+        </a:xfrm>
+      </p:grpSpPr>
+      <p:sp>
+        <p:nvSpPr>
+          <p:cNvPr id="2" name="Título 1">
+            <a:extLst>
+              <a:ext uri="{FF2B5EF4-FFF2-40B4-BE49-F238E27FC236}">
+                <a16:creationId xmlns:a16="http://schemas.microsoft.com/office/drawing/2014/main" id="{F41F692A-64CD-4315-A3DC-8C45B3404DDA}"/>
+              </a:ext>
+            </a:extLst>
+          </p:cNvPr>
+          <p:cNvSpPr>
+            <a:spLocks noGrp="1"/>
+          </p:cNvSpPr>
+          <p:nvPr>
+            <p:ph type="title"/>
+          </p:nvPr>
+        </p:nvSpPr>
+        <p:spPr/>
+        <p:txBody>
+          <a:bodyPr/>
+          <a:lstStyle/>
+          <a:p>
+            <a:r>
+              <a:rPr lang="es-ES" dirty="0"/>
+              <a:t>Apartado 2: LAB</a:t>
+            </a:r>
+          </a:p>
+        </p:txBody>
+      </p:sp>
+      <p:sp>
+        <p:nvSpPr>
+          <p:cNvPr id="3" name="Marcador de contenido 2">
+            <a:extLst>
+              <a:ext uri="{FF2B5EF4-FFF2-40B4-BE49-F238E27FC236}">
+                <a16:creationId xmlns:a16="http://schemas.microsoft.com/office/drawing/2014/main" id="{0D364A50-B51A-4A8C-A180-B7BA398D8A2E}"/>
+              </a:ext>
+            </a:extLst>
+          </p:cNvPr>
+          <p:cNvSpPr>
+            <a:spLocks noGrp="1"/>
+          </p:cNvSpPr>
+          <p:nvPr>
+            <p:ph idx="1"/>
+          </p:nvPr>
+        </p:nvSpPr>
+        <p:spPr>
+          <a:xfrm>
+            <a:off x="1154955" y="2603500"/>
+            <a:ext cx="4261108" cy="3416300"/>
+          </a:xfrm>
+        </p:spPr>
+        <p:txBody>
+          <a:bodyPr/>
+          <a:lstStyle/>
+          <a:p>
+            <a:r>
+              <a:rPr lang="es-ES" dirty="0" err="1"/>
+              <a:t>Lab</a:t>
+            </a:r>
+            <a:r>
+              <a:rPr lang="es-ES" dirty="0"/>
+              <a:t> espacio de color</a:t>
+            </a:r>
+          </a:p>
+          <a:p>
+            <a:r>
+              <a:rPr lang="es-ES" dirty="0"/>
+              <a:t>Diferentes normas: 1976 Vs 1999</a:t>
+            </a:r>
+          </a:p>
+          <a:p>
+            <a:r>
+              <a:rPr lang="es-ES" dirty="0"/>
+              <a:t>Necesidad de una nueva función</a:t>
+            </a:r>
+          </a:p>
+          <a:p>
+            <a:r>
+              <a:rPr lang="es-ES" dirty="0"/>
+              <a:t>Se programa siguiendo la versión de Matlab de guía</a:t>
+            </a:r>
+          </a:p>
+          <a:p>
+            <a:r>
+              <a:rPr lang="es-ES" dirty="0"/>
+              <a:t>Resultados idénticos</a:t>
+            </a:r>
+          </a:p>
+        </p:txBody>
+      </p:sp>
+      <p:pic>
+        <p:nvPicPr>
+          <p:cNvPr id="5" name="Imagen 4" descr="Gráfico, Gráfico de dispersión&#10;&#10;Descripción generada automáticamente">
+            <a:extLst>
+              <a:ext uri="{FF2B5EF4-FFF2-40B4-BE49-F238E27FC236}">
+                <a16:creationId xmlns:a16="http://schemas.microsoft.com/office/drawing/2014/main" id="{9D50BB85-D517-48F8-9A0F-593BE6F2551C}"/>
+              </a:ext>
+            </a:extLst>
+          </p:cNvPr>
+          <p:cNvPicPr>
+            <a:picLocks noChangeAspect="1"/>
+          </p:cNvPicPr>
+          <p:nvPr/>
+        </p:nvPicPr>
+        <p:blipFill>
+          <a:blip r:embed="rId2">
+            <a:extLst>
+              <a:ext uri="{28A0092B-C50C-407E-A947-70E740481C1C}">
+                <a14:useLocalDpi xmlns:a14="http://schemas.microsoft.com/office/drawing/2010/main" val="0"/>
+              </a:ext>
+            </a:extLst>
+          </a:blip>
+          <a:stretch>
+            <a:fillRect/>
+          </a:stretch>
+        </p:blipFill>
+        <p:spPr>
+          <a:xfrm>
+            <a:off x="7329705" y="1988628"/>
+            <a:ext cx="3173707" cy="2323022"/>
+          </a:xfrm>
+          <a:prstGeom prst="rect">
+            <a:avLst/>
+          </a:prstGeom>
+        </p:spPr>
+      </p:pic>
+      <p:pic>
+        <p:nvPicPr>
+          <p:cNvPr id="7" name="Imagen 6" descr="Gráfico, Gráfico de dispersión&#10;&#10;Descripción generada automáticamente">
+            <a:extLst>
+              <a:ext uri="{FF2B5EF4-FFF2-40B4-BE49-F238E27FC236}">
+                <a16:creationId xmlns:a16="http://schemas.microsoft.com/office/drawing/2014/main" id="{99CC07F1-C68A-4850-BDD8-9ED350379A2D}"/>
+              </a:ext>
+            </a:extLst>
+          </p:cNvPr>
+          <p:cNvPicPr>
+            <a:picLocks noChangeAspect="1"/>
+          </p:cNvPicPr>
+          <p:nvPr/>
+        </p:nvPicPr>
+        <p:blipFill>
+          <a:blip r:embed="rId3">
+            <a:extLst>
+              <a:ext uri="{28A0092B-C50C-407E-A947-70E740481C1C}">
+                <a14:useLocalDpi xmlns:a14="http://schemas.microsoft.com/office/drawing/2010/main" val="0"/>
+              </a:ext>
+            </a:extLst>
+          </a:blip>
+          <a:stretch>
+            <a:fillRect/>
+          </a:stretch>
+        </p:blipFill>
+        <p:spPr>
+          <a:xfrm>
+            <a:off x="7329705" y="4311650"/>
+            <a:ext cx="3173707" cy="2338235"/>
+          </a:xfrm>
+          <a:prstGeom prst="rect">
+            <a:avLst/>
+          </a:prstGeom>
+        </p:spPr>
+      </p:pic>
+      <p:sp>
+        <p:nvSpPr>
+          <p:cNvPr id="8" name="CuadroTexto 7">
+            <a:extLst>
+              <a:ext uri="{FF2B5EF4-FFF2-40B4-BE49-F238E27FC236}">
+                <a16:creationId xmlns:a16="http://schemas.microsoft.com/office/drawing/2014/main" id="{FE8972BE-F244-44D0-BF9B-985D8013AA6F}"/>
+              </a:ext>
+            </a:extLst>
+          </p:cNvPr>
+          <p:cNvSpPr txBox="1"/>
+          <p:nvPr/>
+        </p:nvSpPr>
+        <p:spPr>
+          <a:xfrm>
+            <a:off x="10769600" y="2351314"/>
+            <a:ext cx="899886" cy="369332"/>
+          </a:xfrm>
+          <a:prstGeom prst="rect">
+            <a:avLst/>
+          </a:prstGeom>
+          <a:noFill/>
+        </p:spPr>
+        <p:txBody>
+          <a:bodyPr wrap="square" rtlCol="0">
+            <a:spAutoFit/>
+          </a:bodyPr>
+          <a:lstStyle/>
+          <a:p>
+            <a:r>
+              <a:rPr lang="es-ES" dirty="0"/>
+              <a:t>Lab76</a:t>
+            </a:r>
+          </a:p>
+        </p:txBody>
+      </p:sp>
+      <p:sp>
+        <p:nvSpPr>
+          <p:cNvPr id="9" name="CuadroTexto 8">
+            <a:extLst>
+              <a:ext uri="{FF2B5EF4-FFF2-40B4-BE49-F238E27FC236}">
+                <a16:creationId xmlns:a16="http://schemas.microsoft.com/office/drawing/2014/main" id="{5CAA10E4-97B5-462E-AAD2-0C292B07B994}"/>
+              </a:ext>
+            </a:extLst>
+          </p:cNvPr>
+          <p:cNvSpPr txBox="1"/>
+          <p:nvPr/>
+        </p:nvSpPr>
+        <p:spPr>
+          <a:xfrm>
+            <a:off x="10769600" y="4492171"/>
+            <a:ext cx="899886" cy="369332"/>
+          </a:xfrm>
+          <a:prstGeom prst="rect">
+            <a:avLst/>
+          </a:prstGeom>
+          <a:noFill/>
+        </p:spPr>
+        <p:txBody>
+          <a:bodyPr wrap="square" rtlCol="0">
+            <a:spAutoFit/>
+          </a:bodyPr>
+          <a:lstStyle/>
+          <a:p>
+            <a:r>
+              <a:rPr lang="es-ES" dirty="0"/>
+              <a:t>Lab99</a:t>
+            </a:r>
+          </a:p>
+        </p:txBody>
+      </p:sp>
+    </p:spTree>
+    <p:extLst>
+      <p:ext uri="{BB962C8B-B14F-4D97-AF65-F5344CB8AC3E}">
+        <p14:creationId xmlns:p14="http://schemas.microsoft.com/office/powerpoint/2010/main" val="1597067894"/>
+      </p:ext>
+    </p:extLst>
+  </p:cSld>
+  <p:clrMapOvr>
+    <a:masterClrMapping/>
+  </p:clrMapOvr>
+</p:sld>
+</file>
+
+<file path=ppt/slides/slide15.xml><?xml version="1.0" encoding="utf-8"?>
+<p:sld xmlns:a="http://schemas.openxmlformats.org/drawingml/2006/main" xmlns:r="http://schemas.openxmlformats.org/officeDocument/2006/relationships" xmlns:p="http://schemas.openxmlformats.org/presentationml/2006/main">
+  <p:cSld>
+    <p:spTree>
+      <p:nvGrpSpPr>
+        <p:cNvPr id="1" name=""/>
+        <p:cNvGrpSpPr/>
+        <p:nvPr/>
+      </p:nvGrpSpPr>
+      <p:grpSpPr>
+        <a:xfrm>
+          <a:off x="0" y="0"/>
+          <a:ext cx="0" cy="0"/>
+          <a:chOff x="0" y="0"/>
+          <a:chExt cx="0" cy="0"/>
+        </a:xfrm>
+      </p:grpSpPr>
+      <p:sp>
+        <p:nvSpPr>
+          <p:cNvPr id="4" name="CuadroTexto 3">
+            <a:extLst>
+              <a:ext uri="{FF2B5EF4-FFF2-40B4-BE49-F238E27FC236}">
+                <a16:creationId xmlns:a16="http://schemas.microsoft.com/office/drawing/2014/main" id="{82AF1BD1-044F-434C-9E2D-46D8DEC1A7CF}"/>
+              </a:ext>
+            </a:extLst>
+          </p:cNvPr>
+          <p:cNvSpPr txBox="1"/>
+          <p:nvPr/>
+        </p:nvSpPr>
+        <p:spPr>
+          <a:xfrm>
+            <a:off x="2873827" y="5283200"/>
+            <a:ext cx="899886" cy="369332"/>
+          </a:xfrm>
+          <a:prstGeom prst="rect">
+            <a:avLst/>
+          </a:prstGeom>
+          <a:noFill/>
+        </p:spPr>
+        <p:txBody>
+          <a:bodyPr wrap="square" rtlCol="0">
+            <a:spAutoFit/>
+          </a:bodyPr>
+          <a:lstStyle/>
+          <a:p>
+            <a:r>
+              <a:rPr lang="es-ES" dirty="0"/>
+              <a:t>Lab76</a:t>
+            </a:r>
+          </a:p>
+        </p:txBody>
+      </p:sp>
+      <p:sp>
+        <p:nvSpPr>
+          <p:cNvPr id="5" name="CuadroTexto 4">
+            <a:extLst>
+              <a:ext uri="{FF2B5EF4-FFF2-40B4-BE49-F238E27FC236}">
+                <a16:creationId xmlns:a16="http://schemas.microsoft.com/office/drawing/2014/main" id="{9A54FD68-3C5D-4BBE-9573-E999BA4DA1F6}"/>
+              </a:ext>
+            </a:extLst>
+          </p:cNvPr>
+          <p:cNvSpPr txBox="1"/>
+          <p:nvPr/>
+        </p:nvSpPr>
+        <p:spPr>
+          <a:xfrm>
+            <a:off x="8418289" y="5283200"/>
+            <a:ext cx="899886" cy="369332"/>
+          </a:xfrm>
+          <a:prstGeom prst="rect">
+            <a:avLst/>
+          </a:prstGeom>
+          <a:noFill/>
+        </p:spPr>
+        <p:txBody>
+          <a:bodyPr wrap="square" rtlCol="0">
+            <a:spAutoFit/>
+          </a:bodyPr>
+          <a:lstStyle/>
+          <a:p>
+            <a:r>
+              <a:rPr lang="es-ES" dirty="0"/>
+              <a:t>Lab99</a:t>
+            </a:r>
+          </a:p>
+        </p:txBody>
+      </p:sp>
+      <p:pic>
+        <p:nvPicPr>
+          <p:cNvPr id="7" name="Imagen 6" descr="Mapa&#10;&#10;Descripción generada automáticamente">
+            <a:extLst>
+              <a:ext uri="{FF2B5EF4-FFF2-40B4-BE49-F238E27FC236}">
+                <a16:creationId xmlns:a16="http://schemas.microsoft.com/office/drawing/2014/main" id="{3E392C6C-C7F8-4055-A236-0BA0CCD10840}"/>
+              </a:ext>
+            </a:extLst>
+          </p:cNvPr>
+          <p:cNvPicPr>
+            <a:picLocks noChangeAspect="1"/>
+          </p:cNvPicPr>
+          <p:nvPr/>
+        </p:nvPicPr>
+        <p:blipFill>
+          <a:blip r:embed="rId2">
+            <a:extLst>
+              <a:ext uri="{28A0092B-C50C-407E-A947-70E740481C1C}">
+                <a14:useLocalDpi xmlns:a14="http://schemas.microsoft.com/office/drawing/2010/main" val="0"/>
+              </a:ext>
+            </a:extLst>
+          </a:blip>
+          <a:stretch>
+            <a:fillRect/>
+          </a:stretch>
+        </p:blipFill>
+        <p:spPr>
+          <a:xfrm>
+            <a:off x="1551873" y="1205468"/>
+            <a:ext cx="3543795" cy="3553321"/>
+          </a:xfrm>
+          <a:prstGeom prst="rect">
+            <a:avLst/>
+          </a:prstGeom>
+        </p:spPr>
+      </p:pic>
+      <p:pic>
+        <p:nvPicPr>
+          <p:cNvPr id="11" name="Imagen 10" descr="Mapa&#10;&#10;Descripción generada automáticamente">
+            <a:extLst>
+              <a:ext uri="{FF2B5EF4-FFF2-40B4-BE49-F238E27FC236}">
+                <a16:creationId xmlns:a16="http://schemas.microsoft.com/office/drawing/2014/main" id="{E7220050-A194-40D1-BD53-BDBB5DC7DA25}"/>
+              </a:ext>
+            </a:extLst>
+          </p:cNvPr>
+          <p:cNvPicPr>
+            <a:picLocks noChangeAspect="1"/>
+          </p:cNvPicPr>
+          <p:nvPr/>
+        </p:nvPicPr>
+        <p:blipFill>
+          <a:blip r:embed="rId3">
+            <a:extLst>
+              <a:ext uri="{28A0092B-C50C-407E-A947-70E740481C1C}">
+                <a14:useLocalDpi xmlns:a14="http://schemas.microsoft.com/office/drawing/2010/main" val="0"/>
+              </a:ext>
+            </a:extLst>
+          </a:blip>
+          <a:stretch>
+            <a:fillRect/>
+          </a:stretch>
+        </p:blipFill>
+        <p:spPr>
+          <a:xfrm>
+            <a:off x="7096332" y="1205468"/>
+            <a:ext cx="3543795" cy="3534268"/>
+          </a:xfrm>
+          <a:prstGeom prst="rect">
+            <a:avLst/>
+          </a:prstGeom>
+        </p:spPr>
+      </p:pic>
+    </p:spTree>
+    <p:extLst>
+      <p:ext uri="{BB962C8B-B14F-4D97-AF65-F5344CB8AC3E}">
+        <p14:creationId xmlns:p14="http://schemas.microsoft.com/office/powerpoint/2010/main" val="410934897"/>
+      </p:ext>
+    </p:extLst>
+  </p:cSld>
+  <p:clrMapOvr>
+    <a:masterClrMapping/>
+  </p:clrMapOvr>
+</p:sld>
+</file>
+
+<file path=ppt/slides/slide16.xml><?xml version="1.0" encoding="utf-8"?>
+<p:sld xmlns:a="http://schemas.openxmlformats.org/drawingml/2006/main" xmlns:r="http://schemas.openxmlformats.org/officeDocument/2006/relationships" xmlns:p="http://schemas.openxmlformats.org/presentationml/2006/main">
+  <p:cSld>
+    <p:spTree>
+      <p:nvGrpSpPr>
+        <p:cNvPr id="1" name=""/>
+        <p:cNvGrpSpPr/>
+        <p:nvPr/>
+      </p:nvGrpSpPr>
+      <p:grpSpPr>
+        <a:xfrm>
+          <a:off x="0" y="0"/>
+          <a:ext cx="0" cy="0"/>
+          <a:chOff x="0" y="0"/>
+          <a:chExt cx="0" cy="0"/>
+        </a:xfrm>
+      </p:grpSpPr>
+      <p:sp>
+        <p:nvSpPr>
+          <p:cNvPr id="2" name="Título 1">
+            <a:extLst>
+              <a:ext uri="{FF2B5EF4-FFF2-40B4-BE49-F238E27FC236}">
+                <a16:creationId xmlns:a16="http://schemas.microsoft.com/office/drawing/2014/main" id="{7CB18640-6ACB-4009-870D-2DBE63694AC3}"/>
+              </a:ext>
+            </a:extLst>
+          </p:cNvPr>
+          <p:cNvSpPr>
+            <a:spLocks noGrp="1"/>
+          </p:cNvSpPr>
+          <p:nvPr>
+            <p:ph type="title"/>
+          </p:nvPr>
+        </p:nvSpPr>
+        <p:spPr/>
+        <p:txBody>
+          <a:bodyPr/>
+          <a:lstStyle/>
+          <a:p>
+            <a:r>
+              <a:rPr lang="es-ES" dirty="0"/>
+              <a:t>Apartado 3:Filtros de textura</a:t>
+            </a:r>
+          </a:p>
+        </p:txBody>
+      </p:sp>
+      <p:sp>
+        <p:nvSpPr>
+          <p:cNvPr id="3" name="Marcador de contenido 2">
+            <a:extLst>
+              <a:ext uri="{FF2B5EF4-FFF2-40B4-BE49-F238E27FC236}">
+                <a16:creationId xmlns:a16="http://schemas.microsoft.com/office/drawing/2014/main" id="{CEE0CE77-6DDF-4F23-A81B-448A77215BEA}"/>
+              </a:ext>
+            </a:extLst>
+          </p:cNvPr>
+          <p:cNvSpPr>
+            <a:spLocks noGrp="1"/>
+          </p:cNvSpPr>
+          <p:nvPr>
+            <p:ph idx="1"/>
+          </p:nvPr>
+        </p:nvSpPr>
+        <p:spPr/>
+        <p:txBody>
+          <a:bodyPr/>
+          <a:lstStyle/>
+          <a:p>
+            <a:pPr>
+              <a:lnSpc>
+                <a:spcPct val="150000"/>
+              </a:lnSpc>
+            </a:pPr>
+            <a:r>
+              <a:rPr lang="es-ES" dirty="0"/>
+              <a:t>Filtros de textura definidos por características estadísticas</a:t>
+            </a:r>
+          </a:p>
+          <a:p>
+            <a:pPr>
+              <a:lnSpc>
+                <a:spcPct val="150000"/>
+              </a:lnSpc>
+            </a:pPr>
+            <a:r>
+              <a:rPr lang="es-ES" dirty="0"/>
+              <a:t>3 filtros:</a:t>
+            </a:r>
+          </a:p>
+          <a:p>
+            <a:pPr lvl="1">
+              <a:lnSpc>
+                <a:spcPct val="150000"/>
+              </a:lnSpc>
+            </a:pPr>
+            <a:r>
+              <a:rPr lang="es-ES" dirty="0"/>
+              <a:t>Entropía: se encuentra alternativa</a:t>
+            </a:r>
+          </a:p>
+          <a:p>
+            <a:pPr lvl="1">
+              <a:lnSpc>
+                <a:spcPct val="150000"/>
+              </a:lnSpc>
+            </a:pPr>
+            <a:r>
+              <a:rPr lang="es-ES" dirty="0"/>
+              <a:t>Rango: Se tiene que programar</a:t>
+            </a:r>
+          </a:p>
+          <a:p>
+            <a:pPr lvl="1">
+              <a:lnSpc>
+                <a:spcPct val="150000"/>
+              </a:lnSpc>
+            </a:pPr>
+            <a:r>
+              <a:rPr lang="es-ES" dirty="0"/>
+              <a:t>Desviación típica: Se tiene que programar</a:t>
+            </a:r>
+          </a:p>
+          <a:p>
+            <a:pPr>
+              <a:lnSpc>
+                <a:spcPct val="150000"/>
+              </a:lnSpc>
+            </a:pPr>
+            <a:r>
+              <a:rPr lang="es-ES" dirty="0"/>
+              <a:t>Resultados iguales</a:t>
+            </a:r>
+          </a:p>
+        </p:txBody>
+      </p:sp>
+    </p:spTree>
+    <p:extLst>
+      <p:ext uri="{BB962C8B-B14F-4D97-AF65-F5344CB8AC3E}">
+        <p14:creationId xmlns:p14="http://schemas.microsoft.com/office/powerpoint/2010/main" val="457301582"/>
+      </p:ext>
+    </p:extLst>
+  </p:cSld>
+  <p:clrMapOvr>
+    <a:masterClrMapping/>
+  </p:clrMapOvr>
+</p:sld>
+</file>
+
+<file path=ppt/slides/slide17.xml><?xml version="1.0" encoding="utf-8"?>
+<p:sld xmlns:a="http://schemas.openxmlformats.org/drawingml/2006/main" xmlns:r="http://schemas.openxmlformats.org/officeDocument/2006/relationships" xmlns:p="http://schemas.openxmlformats.org/presentationml/2006/main">
+  <p:cSld>
+    <p:spTree>
+      <p:nvGrpSpPr>
+        <p:cNvPr id="1" name=""/>
+        <p:cNvGrpSpPr/>
+        <p:nvPr/>
+      </p:nvGrpSpPr>
+      <p:grpSpPr>
+        <a:xfrm>
+          <a:off x="0" y="0"/>
+          <a:ext cx="0" cy="0"/>
+          <a:chOff x="0" y="0"/>
+          <a:chExt cx="0" cy="0"/>
+        </a:xfrm>
+      </p:grpSpPr>
+      <p:sp>
+        <p:nvSpPr>
+          <p:cNvPr id="4" name="CuadroTexto 3">
+            <a:extLst>
+              <a:ext uri="{FF2B5EF4-FFF2-40B4-BE49-F238E27FC236}">
+                <a16:creationId xmlns:a16="http://schemas.microsoft.com/office/drawing/2014/main" id="{82AF1BD1-044F-434C-9E2D-46D8DEC1A7CF}"/>
+              </a:ext>
+            </a:extLst>
+          </p:cNvPr>
+          <p:cNvSpPr txBox="1"/>
+          <p:nvPr/>
+        </p:nvSpPr>
+        <p:spPr>
+          <a:xfrm>
+            <a:off x="2756037" y="5283200"/>
+            <a:ext cx="1135465" cy="369332"/>
+          </a:xfrm>
+          <a:prstGeom prst="rect">
+            <a:avLst/>
+          </a:prstGeom>
+          <a:noFill/>
+        </p:spPr>
+        <p:txBody>
+          <a:bodyPr wrap="square" rtlCol="0">
+            <a:spAutoFit/>
+          </a:bodyPr>
+          <a:lstStyle/>
+          <a:p>
+            <a:pPr algn="ctr"/>
+            <a:r>
+              <a:rPr lang="es-ES" dirty="0"/>
+              <a:t>Matlab</a:t>
+            </a:r>
+          </a:p>
+        </p:txBody>
+      </p:sp>
+      <p:sp>
+        <p:nvSpPr>
+          <p:cNvPr id="5" name="CuadroTexto 4">
+            <a:extLst>
+              <a:ext uri="{FF2B5EF4-FFF2-40B4-BE49-F238E27FC236}">
+                <a16:creationId xmlns:a16="http://schemas.microsoft.com/office/drawing/2014/main" id="{9A54FD68-3C5D-4BBE-9573-E999BA4DA1F6}"/>
+              </a:ext>
+            </a:extLst>
+          </p:cNvPr>
+          <p:cNvSpPr txBox="1"/>
+          <p:nvPr/>
+        </p:nvSpPr>
+        <p:spPr>
+          <a:xfrm>
+            <a:off x="8300500" y="5283200"/>
+            <a:ext cx="1135465" cy="369332"/>
+          </a:xfrm>
+          <a:prstGeom prst="rect">
+            <a:avLst/>
+          </a:prstGeom>
+          <a:noFill/>
+        </p:spPr>
+        <p:txBody>
+          <a:bodyPr wrap="square" rtlCol="0">
+            <a:spAutoFit/>
+          </a:bodyPr>
+          <a:lstStyle/>
+          <a:p>
+            <a:pPr algn="ctr"/>
+            <a:r>
+              <a:rPr lang="es-ES" dirty="0"/>
+              <a:t>Python</a:t>
+            </a:r>
+          </a:p>
+        </p:txBody>
+      </p:sp>
+      <p:pic>
+        <p:nvPicPr>
+          <p:cNvPr id="3" name="Imagen 2" descr="Escala de tiempo&#10;&#10;Descripción generada automáticamente">
+            <a:extLst>
+              <a:ext uri="{FF2B5EF4-FFF2-40B4-BE49-F238E27FC236}">
+                <a16:creationId xmlns:a16="http://schemas.microsoft.com/office/drawing/2014/main" id="{A4C48F62-2B95-46C0-81DE-6FEBA20F32C6}"/>
+              </a:ext>
+            </a:extLst>
+          </p:cNvPr>
+          <p:cNvPicPr>
+            <a:picLocks noChangeAspect="1"/>
+          </p:cNvPicPr>
+          <p:nvPr/>
+        </p:nvPicPr>
+        <p:blipFill>
+          <a:blip r:embed="rId2">
+            <a:extLst>
+              <a:ext uri="{28A0092B-C50C-407E-A947-70E740481C1C}">
+                <a14:useLocalDpi xmlns:a14="http://schemas.microsoft.com/office/drawing/2010/main" val="0"/>
+              </a:ext>
+            </a:extLst>
+          </a:blip>
+          <a:stretch>
+            <a:fillRect/>
+          </a:stretch>
+        </p:blipFill>
+        <p:spPr>
+          <a:xfrm>
+            <a:off x="1094608" y="1279271"/>
+            <a:ext cx="4458322" cy="3648584"/>
+          </a:xfrm>
+          <a:prstGeom prst="rect">
+            <a:avLst/>
+          </a:prstGeom>
+        </p:spPr>
+      </p:pic>
+      <p:pic>
+        <p:nvPicPr>
+          <p:cNvPr id="8" name="Imagen 7" descr="Escala de tiempo&#10;&#10;Descripción generada automáticamente">
+            <a:extLst>
+              <a:ext uri="{FF2B5EF4-FFF2-40B4-BE49-F238E27FC236}">
+                <a16:creationId xmlns:a16="http://schemas.microsoft.com/office/drawing/2014/main" id="{2A2BC0D0-9972-4C85-80BA-D80ADB0E13B7}"/>
+              </a:ext>
+            </a:extLst>
+          </p:cNvPr>
+          <p:cNvPicPr>
+            <a:picLocks noChangeAspect="1"/>
+          </p:cNvPicPr>
+          <p:nvPr/>
+        </p:nvPicPr>
+        <p:blipFill>
+          <a:blip r:embed="rId3">
+            <a:extLst>
+              <a:ext uri="{28A0092B-C50C-407E-A947-70E740481C1C}">
+                <a14:useLocalDpi xmlns:a14="http://schemas.microsoft.com/office/drawing/2010/main" val="0"/>
+              </a:ext>
+            </a:extLst>
+          </a:blip>
+          <a:stretch>
+            <a:fillRect/>
+          </a:stretch>
+        </p:blipFill>
+        <p:spPr>
+          <a:xfrm>
+            <a:off x="6510465" y="1131613"/>
+            <a:ext cx="4715533" cy="3943900"/>
+          </a:xfrm>
+          <a:prstGeom prst="rect">
+            <a:avLst/>
+          </a:prstGeom>
+        </p:spPr>
+      </p:pic>
+    </p:spTree>
+    <p:extLst>
+      <p:ext uri="{BB962C8B-B14F-4D97-AF65-F5344CB8AC3E}">
+        <p14:creationId xmlns:p14="http://schemas.microsoft.com/office/powerpoint/2010/main" val="2242737219"/>
+      </p:ext>
+    </p:extLst>
+  </p:cSld>
+  <p:clrMapOvr>
+    <a:masterClrMapping/>
+  </p:clrMapOvr>
+</p:sld>
+</file>
+
+<file path=ppt/slides/slide18.xml><?xml version="1.0" encoding="utf-8"?>
+<p:sld xmlns:a="http://schemas.openxmlformats.org/drawingml/2006/main" xmlns:r="http://schemas.openxmlformats.org/officeDocument/2006/relationships" xmlns:p="http://schemas.openxmlformats.org/presentationml/2006/main">
+  <p:cSld>
+    <p:spTree>
+      <p:nvGrpSpPr>
+        <p:cNvPr id="1" name=""/>
+        <p:cNvGrpSpPr/>
+        <p:nvPr/>
+      </p:nvGrpSpPr>
+      <p:grpSpPr>
+        <a:xfrm>
+          <a:off x="0" y="0"/>
+          <a:ext cx="0" cy="0"/>
+          <a:chOff x="0" y="0"/>
+          <a:chExt cx="0" cy="0"/>
+        </a:xfrm>
+      </p:grpSpPr>
+      <p:sp>
+        <p:nvSpPr>
+          <p:cNvPr id="2" name="Título 1">
+            <a:extLst>
+              <a:ext uri="{FF2B5EF4-FFF2-40B4-BE49-F238E27FC236}">
+                <a16:creationId xmlns:a16="http://schemas.microsoft.com/office/drawing/2014/main" id="{1113A4FD-D187-45B2-A2CA-3507A6F9644A}"/>
+              </a:ext>
+            </a:extLst>
+          </p:cNvPr>
+          <p:cNvSpPr>
+            <a:spLocks noGrp="1"/>
+          </p:cNvSpPr>
+          <p:nvPr>
+            <p:ph type="title"/>
+          </p:nvPr>
+        </p:nvSpPr>
+        <p:spPr/>
+        <p:txBody>
+          <a:bodyPr/>
+          <a:lstStyle/>
+          <a:p>
+            <a:r>
+              <a:rPr lang="es-ES" dirty="0"/>
+              <a:t>Apartado 4: Mezcla de características</a:t>
+            </a:r>
+          </a:p>
+        </p:txBody>
+      </p:sp>
+      <p:sp>
+        <p:nvSpPr>
+          <p:cNvPr id="3" name="Marcador de contenido 2">
+            <a:extLst>
+              <a:ext uri="{FF2B5EF4-FFF2-40B4-BE49-F238E27FC236}">
+                <a16:creationId xmlns:a16="http://schemas.microsoft.com/office/drawing/2014/main" id="{5D6CD759-36DD-4D40-88D2-547495690B39}"/>
+              </a:ext>
+            </a:extLst>
+          </p:cNvPr>
+          <p:cNvSpPr>
+            <a:spLocks noGrp="1"/>
+          </p:cNvSpPr>
+          <p:nvPr>
+            <p:ph idx="1"/>
+          </p:nvPr>
+        </p:nvSpPr>
+        <p:spPr>
+          <a:xfrm>
+            <a:off x="1154955" y="2603500"/>
+            <a:ext cx="4941046" cy="3416300"/>
+          </a:xfrm>
+        </p:spPr>
+        <p:txBody>
+          <a:bodyPr/>
+          <a:lstStyle/>
+          <a:p>
+            <a:r>
+              <a:rPr lang="es-ES" dirty="0"/>
+              <a:t>Se mezclan características de textura y color para segmentar</a:t>
+            </a:r>
+          </a:p>
+          <a:p>
+            <a:r>
+              <a:rPr lang="es-ES" dirty="0"/>
+              <a:t>Se escogen ab y la entropía</a:t>
+            </a:r>
+          </a:p>
+          <a:p>
+            <a:r>
+              <a:rPr lang="es-ES" dirty="0"/>
+              <a:t>Necesario estandarizar</a:t>
+            </a:r>
+          </a:p>
+          <a:p>
+            <a:r>
+              <a:rPr lang="es-ES" dirty="0"/>
+              <a:t>Resulta en </a:t>
+            </a:r>
+            <a:r>
+              <a:rPr lang="es-ES" dirty="0" err="1"/>
+              <a:t>sobresegmentación</a:t>
+            </a:r>
+            <a:endParaRPr lang="es-ES" dirty="0"/>
+          </a:p>
+          <a:p>
+            <a:r>
+              <a:rPr lang="es-ES" dirty="0"/>
+              <a:t>Se repite el proceso realizando un </a:t>
+            </a:r>
+            <a:r>
+              <a:rPr lang="es-ES" dirty="0" err="1"/>
+              <a:t>preporcesado</a:t>
+            </a:r>
+            <a:r>
+              <a:rPr lang="es-ES" dirty="0"/>
+              <a:t>: </a:t>
+            </a:r>
+            <a:r>
+              <a:rPr lang="es-ES" dirty="0" err="1"/>
+              <a:t>miltro</a:t>
+            </a:r>
+            <a:r>
+              <a:rPr lang="es-ES" dirty="0"/>
+              <a:t> de media sobre ab</a:t>
+            </a:r>
+          </a:p>
+        </p:txBody>
+      </p:sp>
+      <p:pic>
+        <p:nvPicPr>
+          <p:cNvPr id="5" name="Imagen 4">
+            <a:extLst>
+              <a:ext uri="{FF2B5EF4-FFF2-40B4-BE49-F238E27FC236}">
+                <a16:creationId xmlns:a16="http://schemas.microsoft.com/office/drawing/2014/main" id="{299B2149-31FD-40B0-A4D8-4A0402D2F7A0}"/>
+              </a:ext>
+            </a:extLst>
+          </p:cNvPr>
+          <p:cNvPicPr>
+            <a:picLocks noChangeAspect="1"/>
+          </p:cNvPicPr>
+          <p:nvPr/>
+        </p:nvPicPr>
+        <p:blipFill>
+          <a:blip r:embed="rId2"/>
+          <a:stretch>
+            <a:fillRect/>
+          </a:stretch>
+        </p:blipFill>
+        <p:spPr>
+          <a:xfrm>
+            <a:off x="7502777" y="2603500"/>
+            <a:ext cx="3534268" cy="3515216"/>
+          </a:xfrm>
+          <a:prstGeom prst="rect">
+            <a:avLst/>
+          </a:prstGeom>
+        </p:spPr>
+      </p:pic>
+      <p:pic>
+        <p:nvPicPr>
+          <p:cNvPr id="7" name="Imagen 6" descr="Mapa&#10;&#10;Descripción generada automáticamente">
+            <a:extLst>
+              <a:ext uri="{FF2B5EF4-FFF2-40B4-BE49-F238E27FC236}">
+                <a16:creationId xmlns:a16="http://schemas.microsoft.com/office/drawing/2014/main" id="{E6DDFBC0-5CD2-465A-B462-2092A789ED72}"/>
+              </a:ext>
+            </a:extLst>
+          </p:cNvPr>
+          <p:cNvPicPr>
+            <a:picLocks noChangeAspect="1"/>
+          </p:cNvPicPr>
+          <p:nvPr/>
+        </p:nvPicPr>
+        <p:blipFill>
+          <a:blip r:embed="rId3">
+            <a:extLst>
+              <a:ext uri="{28A0092B-C50C-407E-A947-70E740481C1C}">
+                <a14:useLocalDpi xmlns:a14="http://schemas.microsoft.com/office/drawing/2010/main" val="0"/>
+              </a:ext>
+            </a:extLst>
+          </a:blip>
+          <a:stretch>
+            <a:fillRect/>
+          </a:stretch>
+        </p:blipFill>
+        <p:spPr>
+          <a:xfrm>
+            <a:off x="7464671" y="2555869"/>
+            <a:ext cx="3572374" cy="3562847"/>
+          </a:xfrm>
+          <a:prstGeom prst="rect">
+            <a:avLst/>
+          </a:prstGeom>
+        </p:spPr>
+      </p:pic>
+    </p:spTree>
+    <p:extLst>
+      <p:ext uri="{BB962C8B-B14F-4D97-AF65-F5344CB8AC3E}">
+        <p14:creationId xmlns:p14="http://schemas.microsoft.com/office/powerpoint/2010/main" val="3602488493"/>
+      </p:ext>
+    </p:extLst>
+  </p:cSld>
+  <p:clrMapOvr>
+    <a:masterClrMapping/>
+  </p:clrMapOvr>
+  <p:timing>
+    <p:tnLst>
+      <p:par>
+        <p:cTn id="1" dur="indefinite" restart="never" nodeType="tmRoot">
+          <p:childTnLst>
+            <p:seq concurrent="1" nextAc="seek">
+              <p:cTn id="2" dur="indefinite" nodeType="mainSeq">
+                <p:childTnLst>
+                  <p:par>
+                    <p:cTn id="3" fill="hold">
+                      <p:stCondLst>
+                        <p:cond delay="indefinite"/>
+                      </p:stCondLst>
+                      <p:childTnLst>
+                        <p:par>
+                          <p:cTn id="4" fill="hold">
+                            <p:stCondLst>
+                              <p:cond delay="0"/>
+                            </p:stCondLst>
+                            <p:childTnLst>
+                              <p:par>
+                                <p:cTn id="5" presetID="1" presetClass="entr" presetSubtype="0" fill="hold" nodeType="clickEffect">
+                                  <p:stCondLst>
+                                    <p:cond delay="0"/>
+                                  </p:stCondLst>
+                                  <p:childTnLst>
+                                    <p:set>
+                                      <p:cBhvr>
+                                        <p:cTn id="6" dur="1" fill="hold">
+                                          <p:stCondLst>
+                                            <p:cond delay="0"/>
+                                          </p:stCondLst>
+                                        </p:cTn>
+                                        <p:tgtEl>
+                                          <p:spTgt spid="7"/>
+                                        </p:tgtEl>
+                                        <p:attrNameLst>
+                                          <p:attrName>style.visibility</p:attrName>
+                                        </p:attrNameLst>
+                                      </p:cBhvr>
+                                      <p:to>
+                                        <p:strVal val="visible"/>
+                                      </p:to>
+                                    </p:set>
+                                  </p:childTnLst>
+                                </p:cTn>
+                              </p:par>
+                            </p:childTnLst>
+                          </p:cTn>
+                        </p:par>
+                      </p:childTnLst>
+                    </p:cTn>
+                  </p:par>
+                </p:childTnLst>
+              </p:cTn>
+              <p:prevCondLst>
+                <p:cond evt="onPrev" delay="0">
+                  <p:tgtEl>
+                    <p:sldTgt/>
+                  </p:tgtEl>
+                </p:cond>
+              </p:prevCondLst>
+              <p:nextCondLst>
+                <p:cond evt="onNext" delay="0">
+                  <p:tgtEl>
+                    <p:sldTgt/>
+                  </p:tgtEl>
+                </p:cond>
+              </p:nextCondLst>
+            </p:seq>
+          </p:childTnLst>
+        </p:cTn>
+      </p:par>
+    </p:tnLst>
+  </p:timing>
+</p:sld>
+</file>
+
+<file path=ppt/slides/slide19.xml><?xml version="1.0" encoding="utf-8"?>
+<p:sld xmlns:a="http://schemas.openxmlformats.org/drawingml/2006/main" xmlns:r="http://schemas.openxmlformats.org/officeDocument/2006/relationships" xmlns:p="http://schemas.openxmlformats.org/presentationml/2006/main">
+  <p:cSld>
+    <p:spTree>
+      <p:nvGrpSpPr>
+        <p:cNvPr id="1" name=""/>
+        <p:cNvGrpSpPr/>
+        <p:nvPr/>
+      </p:nvGrpSpPr>
+      <p:grpSpPr>
+        <a:xfrm>
+          <a:off x="0" y="0"/>
+          <a:ext cx="0" cy="0"/>
+          <a:chOff x="0" y="0"/>
+          <a:chExt cx="0" cy="0"/>
+        </a:xfrm>
+      </p:grpSpPr>
+      <p:sp>
+        <p:nvSpPr>
+          <p:cNvPr id="2" name="Título 1">
+            <a:extLst>
+              <a:ext uri="{FF2B5EF4-FFF2-40B4-BE49-F238E27FC236}">
+                <a16:creationId xmlns:a16="http://schemas.microsoft.com/office/drawing/2014/main" id="{C1FE351F-DAF6-4AA6-A1A6-4F1BAADEE70A}"/>
+              </a:ext>
+            </a:extLst>
+          </p:cNvPr>
+          <p:cNvSpPr>
+            <a:spLocks noGrp="1"/>
+          </p:cNvSpPr>
+          <p:nvPr>
+            <p:ph type="title"/>
+          </p:nvPr>
+        </p:nvSpPr>
+        <p:spPr/>
+        <p:txBody>
+          <a:bodyPr/>
+          <a:lstStyle/>
+          <a:p>
+            <a:r>
+              <a:rPr lang="es-ES" dirty="0"/>
+              <a:t>Bonus: celdas respuesta</a:t>
+            </a:r>
+          </a:p>
+        </p:txBody>
+      </p:sp>
+      <p:sp>
+        <p:nvSpPr>
+          <p:cNvPr id="3" name="Marcador de contenido 2">
+            <a:extLst>
+              <a:ext uri="{FF2B5EF4-FFF2-40B4-BE49-F238E27FC236}">
+                <a16:creationId xmlns:a16="http://schemas.microsoft.com/office/drawing/2014/main" id="{61BCDD88-1CC7-4ED7-8BE3-0ED2753F1B7E}"/>
+              </a:ext>
+            </a:extLst>
+          </p:cNvPr>
+          <p:cNvSpPr>
+            <a:spLocks noGrp="1"/>
+          </p:cNvSpPr>
+          <p:nvPr>
+            <p:ph idx="1"/>
+          </p:nvPr>
+        </p:nvSpPr>
+        <p:spPr/>
+        <p:txBody>
+          <a:bodyPr/>
+          <a:lstStyle/>
+          <a:p>
+            <a:r>
+              <a:rPr lang="es-ES" dirty="0"/>
+              <a:t>Se han añadido enlaces a celdas respuesta para ayudar al alumno</a:t>
+            </a:r>
+          </a:p>
+        </p:txBody>
+      </p:sp>
+      <p:pic>
+        <p:nvPicPr>
+          <p:cNvPr id="5" name="Imagen 4">
+            <a:extLst>
+              <a:ext uri="{FF2B5EF4-FFF2-40B4-BE49-F238E27FC236}">
+                <a16:creationId xmlns:a16="http://schemas.microsoft.com/office/drawing/2014/main" id="{AF0DE6AB-4678-4B91-A53E-9C657437DAA7}"/>
+              </a:ext>
+            </a:extLst>
+          </p:cNvPr>
+          <p:cNvPicPr>
+            <a:picLocks noChangeAspect="1"/>
+          </p:cNvPicPr>
+          <p:nvPr/>
+        </p:nvPicPr>
+        <p:blipFill>
+          <a:blip r:embed="rId2"/>
+          <a:stretch>
+            <a:fillRect/>
+          </a:stretch>
+        </p:blipFill>
+        <p:spPr>
+          <a:xfrm>
+            <a:off x="1154954" y="3429000"/>
+            <a:ext cx="5083375" cy="1852933"/>
+          </a:xfrm>
+          <a:prstGeom prst="rect">
+            <a:avLst/>
+          </a:prstGeom>
+        </p:spPr>
+      </p:pic>
+      <p:pic>
+        <p:nvPicPr>
+          <p:cNvPr id="7" name="Imagen 6">
+            <a:extLst>
+              <a:ext uri="{FF2B5EF4-FFF2-40B4-BE49-F238E27FC236}">
+                <a16:creationId xmlns:a16="http://schemas.microsoft.com/office/drawing/2014/main" id="{01761C6B-F5E7-4E49-A251-4C1C9FC06B63}"/>
+              </a:ext>
+            </a:extLst>
+          </p:cNvPr>
+          <p:cNvPicPr>
+            <a:picLocks noChangeAspect="1"/>
+          </p:cNvPicPr>
+          <p:nvPr/>
+        </p:nvPicPr>
+        <p:blipFill>
+          <a:blip r:embed="rId3"/>
+          <a:stretch>
+            <a:fillRect/>
+          </a:stretch>
+        </p:blipFill>
+        <p:spPr>
+          <a:xfrm>
+            <a:off x="6879771" y="3299004"/>
+            <a:ext cx="4762994" cy="2720796"/>
+          </a:xfrm>
+          <a:prstGeom prst="rect">
+            <a:avLst/>
+          </a:prstGeom>
+        </p:spPr>
+      </p:pic>
+      <p:sp>
+        <p:nvSpPr>
+          <p:cNvPr id="8" name="Flecha: a la derecha 7">
+            <a:extLst>
+              <a:ext uri="{FF2B5EF4-FFF2-40B4-BE49-F238E27FC236}">
+                <a16:creationId xmlns:a16="http://schemas.microsoft.com/office/drawing/2014/main" id="{97EAF059-80E5-4EF1-8040-AE1CBB117A2B}"/>
+              </a:ext>
+            </a:extLst>
+          </p:cNvPr>
+          <p:cNvSpPr/>
+          <p:nvPr/>
+        </p:nvSpPr>
+        <p:spPr>
+          <a:xfrm>
+            <a:off x="5217619" y="4875533"/>
+            <a:ext cx="783771" cy="406400"/>
+          </a:xfrm>
+          <a:prstGeom prst="rightArrow">
+            <a:avLst/>
+          </a:prstGeom>
+        </p:spPr>
+        <p:style>
+          <a:lnRef idx="2">
+            <a:schemeClr val="accent1">
+              <a:shade val="50000"/>
+            </a:schemeClr>
+          </a:lnRef>
+          <a:fillRef idx="1">
+            <a:schemeClr val="accent1"/>
+          </a:fillRef>
+          <a:effectRef idx="0">
+            <a:schemeClr val="accent1"/>
+          </a:effectRef>
+          <a:fontRef idx="minor">
+            <a:schemeClr val="lt1"/>
+          </a:fontRef>
+        </p:style>
+        <p:txBody>
+          <a:bodyPr rtlCol="0" anchor="ctr"/>
+          <a:lstStyle/>
+          <a:p>
+            <a:pPr algn="ctr"/>
+            <a:endParaRPr lang="es-ES"/>
+          </a:p>
+        </p:txBody>
+      </p:sp>
+    </p:spTree>
+    <p:extLst>
+      <p:ext uri="{BB962C8B-B14F-4D97-AF65-F5344CB8AC3E}">
+        <p14:creationId xmlns:p14="http://schemas.microsoft.com/office/powerpoint/2010/main" val="134554911"/>
+      </p:ext>
+    </p:extLst>
+  </p:cSld>
+  <p:clrMapOvr>
+    <a:masterClrMapping/>
+  </p:clrMapOvr>
+</p:sld>
+</file>
+
 <file path=ppt/slides/slide2.xml><?xml version="1.0" encoding="utf-8"?>
 <p:sld xmlns:a="http://schemas.openxmlformats.org/drawingml/2006/main" xmlns:r="http://schemas.openxmlformats.org/officeDocument/2006/relationships" xmlns:p="http://schemas.openxmlformats.org/presentationml/2006/main">
   <p:cSld>
@@ -17958,6 +19689,229 @@
 </p:sld>
 </file>
 
+<file path=ppt/slides/slide20.xml><?xml version="1.0" encoding="utf-8"?>
+<p:sld xmlns:a="http://schemas.openxmlformats.org/drawingml/2006/main" xmlns:r="http://schemas.openxmlformats.org/officeDocument/2006/relationships" xmlns:p="http://schemas.openxmlformats.org/presentationml/2006/main">
+  <p:cSld>
+    <p:spTree>
+      <p:nvGrpSpPr>
+        <p:cNvPr id="1" name=""/>
+        <p:cNvGrpSpPr/>
+        <p:nvPr/>
+      </p:nvGrpSpPr>
+      <p:grpSpPr>
+        <a:xfrm>
+          <a:off x="0" y="0"/>
+          <a:ext cx="0" cy="0"/>
+          <a:chOff x="0" y="0"/>
+          <a:chExt cx="0" cy="0"/>
+        </a:xfrm>
+      </p:grpSpPr>
+      <p:sp>
+        <p:nvSpPr>
+          <p:cNvPr id="2" name="Título 1">
+            <a:extLst>
+              <a:ext uri="{FF2B5EF4-FFF2-40B4-BE49-F238E27FC236}">
+                <a16:creationId xmlns:a16="http://schemas.microsoft.com/office/drawing/2014/main" id="{1DD9EF30-924A-4738-A6D4-D51DE6499ED5}"/>
+              </a:ext>
+            </a:extLst>
+          </p:cNvPr>
+          <p:cNvSpPr>
+            <a:spLocks noGrp="1"/>
+          </p:cNvSpPr>
+          <p:nvPr>
+            <p:ph type="title"/>
+          </p:nvPr>
+        </p:nvSpPr>
+        <p:spPr/>
+        <p:txBody>
+          <a:bodyPr/>
+          <a:lstStyle/>
+          <a:p>
+            <a:r>
+              <a:rPr lang="es-ES" dirty="0"/>
+              <a:t>Conclusiones y trabajos futuros</a:t>
+            </a:r>
+          </a:p>
+        </p:txBody>
+      </p:sp>
+      <p:sp>
+        <p:nvSpPr>
+          <p:cNvPr id="4" name="Marcador de texto 3">
+            <a:extLst>
+              <a:ext uri="{FF2B5EF4-FFF2-40B4-BE49-F238E27FC236}">
+                <a16:creationId xmlns:a16="http://schemas.microsoft.com/office/drawing/2014/main" id="{5FF8EA23-F2D5-4DE4-AAD5-95A8C071F868}"/>
+              </a:ext>
+            </a:extLst>
+          </p:cNvPr>
+          <p:cNvSpPr>
+            <a:spLocks noGrp="1"/>
+          </p:cNvSpPr>
+          <p:nvPr>
+            <p:ph type="body" idx="1"/>
+          </p:nvPr>
+        </p:nvSpPr>
+        <p:spPr/>
+        <p:txBody>
+          <a:bodyPr/>
+          <a:lstStyle/>
+          <a:p>
+            <a:r>
+              <a:rPr lang="es-ES" dirty="0"/>
+              <a:t>Conclusiones</a:t>
+            </a:r>
+          </a:p>
+        </p:txBody>
+      </p:sp>
+      <p:sp>
+        <p:nvSpPr>
+          <p:cNvPr id="3" name="Marcador de contenido 2">
+            <a:extLst>
+              <a:ext uri="{FF2B5EF4-FFF2-40B4-BE49-F238E27FC236}">
+                <a16:creationId xmlns:a16="http://schemas.microsoft.com/office/drawing/2014/main" id="{D5F21D5B-B446-46C0-AF3A-34E188AA60C7}"/>
+              </a:ext>
+            </a:extLst>
+          </p:cNvPr>
+          <p:cNvSpPr>
+            <a:spLocks noGrp="1"/>
+          </p:cNvSpPr>
+          <p:nvPr>
+            <p:ph sz="half" idx="2"/>
+          </p:nvPr>
+        </p:nvSpPr>
+        <p:spPr/>
+        <p:txBody>
+          <a:bodyPr/>
+          <a:lstStyle/>
+          <a:p>
+            <a:r>
+              <a:rPr lang="es-ES" dirty="0"/>
+              <a:t>Se ha cumplido el objetivo principal</a:t>
+            </a:r>
+          </a:p>
+          <a:p>
+            <a:r>
+              <a:rPr lang="es-ES" dirty="0"/>
+              <a:t>Prácticas 2, 3, 4, 5 y 6 cambios mínimos</a:t>
+            </a:r>
+          </a:p>
+          <a:p>
+            <a:r>
+              <a:rPr lang="es-ES" dirty="0"/>
+              <a:t>Prácticas 1, 7, 8  y 9 cambios más significativos</a:t>
+            </a:r>
+          </a:p>
+        </p:txBody>
+      </p:sp>
+      <p:sp>
+        <p:nvSpPr>
+          <p:cNvPr id="5" name="Marcador de texto 4">
+            <a:extLst>
+              <a:ext uri="{FF2B5EF4-FFF2-40B4-BE49-F238E27FC236}">
+                <a16:creationId xmlns:a16="http://schemas.microsoft.com/office/drawing/2014/main" id="{FD8EAFE5-93B4-4387-A1E7-AB1E7732212E}"/>
+              </a:ext>
+            </a:extLst>
+          </p:cNvPr>
+          <p:cNvSpPr>
+            <a:spLocks noGrp="1"/>
+          </p:cNvSpPr>
+          <p:nvPr>
+            <p:ph type="body" sz="quarter" idx="3"/>
+          </p:nvPr>
+        </p:nvSpPr>
+        <p:spPr/>
+        <p:txBody>
+          <a:bodyPr/>
+          <a:lstStyle/>
+          <a:p>
+            <a:r>
+              <a:rPr lang="es-ES" dirty="0"/>
+              <a:t>Trabajos futuros</a:t>
+            </a:r>
+          </a:p>
+        </p:txBody>
+      </p:sp>
+      <p:sp>
+        <p:nvSpPr>
+          <p:cNvPr id="6" name="Marcador de contenido 5">
+            <a:extLst>
+              <a:ext uri="{FF2B5EF4-FFF2-40B4-BE49-F238E27FC236}">
+                <a16:creationId xmlns:a16="http://schemas.microsoft.com/office/drawing/2014/main" id="{B117776A-029B-4CF1-AABF-FAEC9426780E}"/>
+              </a:ext>
+            </a:extLst>
+          </p:cNvPr>
+          <p:cNvSpPr>
+            <a:spLocks noGrp="1"/>
+          </p:cNvSpPr>
+          <p:nvPr>
+            <p:ph sz="quarter" idx="4"/>
+          </p:nvPr>
+        </p:nvSpPr>
+        <p:spPr/>
+        <p:txBody>
+          <a:bodyPr/>
+          <a:lstStyle/>
+          <a:p>
+            <a:r>
+              <a:rPr lang="es-ES" dirty="0"/>
+              <a:t>Implementar en la asignatura</a:t>
+            </a:r>
+          </a:p>
+          <a:p>
+            <a:r>
+              <a:rPr lang="es-ES" dirty="0"/>
+              <a:t>Implementar en </a:t>
+            </a:r>
+            <a:r>
+              <a:rPr lang="es-ES" dirty="0" err="1"/>
+              <a:t>Robotics</a:t>
+            </a:r>
+            <a:r>
+              <a:rPr lang="es-ES" dirty="0"/>
+              <a:t> </a:t>
+            </a:r>
+            <a:r>
+              <a:rPr lang="es-ES" dirty="0" err="1"/>
+              <a:t>academy</a:t>
+            </a:r>
+            <a:endParaRPr lang="es-ES" dirty="0"/>
+          </a:p>
+          <a:p>
+            <a:r>
+              <a:rPr lang="es-ES" dirty="0"/>
+              <a:t>Mejoras en el código: RGB2ind</a:t>
+            </a:r>
+          </a:p>
+          <a:p>
+            <a:r>
+              <a:rPr lang="es-ES" dirty="0"/>
+              <a:t>Mejora video</a:t>
+            </a:r>
+          </a:p>
+          <a:p>
+            <a:r>
+              <a:rPr lang="es-ES" dirty="0"/>
+              <a:t>Contribuir </a:t>
+            </a:r>
+            <a:r>
+              <a:rPr lang="es-ES"/>
+              <a:t>a biblioteca</a:t>
+            </a:r>
+          </a:p>
+        </p:txBody>
+      </p:sp>
+    </p:spTree>
+    <p:extLst>
+      <p:ext uri="{BB962C8B-B14F-4D97-AF65-F5344CB8AC3E}">
+        <p14:creationId xmlns:p14="http://schemas.microsoft.com/office/powerpoint/2010/main" val="52422641"/>
+      </p:ext>
+    </p:extLst>
+  </p:cSld>
+  <p:clrMapOvr>
+    <a:masterClrMapping/>
+  </p:clrMapOvr>
+</p:sld>
+</file>
+
 <file path=ppt/slides/slide3.xml><?xml version="1.0" encoding="utf-8"?>
 <p:sld xmlns:a="http://schemas.openxmlformats.org/drawingml/2006/main" xmlns:r="http://schemas.openxmlformats.org/officeDocument/2006/relationships" xmlns:p="http://schemas.openxmlformats.org/presentationml/2006/main">
   <p:cSld>
@@ -18016,6 +19970,257 @@
             <a:spLocks noGrp="1"/>
           </p:cNvSpPr>
           <p:nvPr>
+            <p:ph idx="1"/>
+          </p:nvPr>
+        </p:nvSpPr>
+        <p:spPr/>
+        <p:txBody>
+          <a:bodyPr/>
+          <a:lstStyle/>
+          <a:p>
+            <a:r>
+              <a:rPr lang="es-ES" dirty="0"/>
+              <a:t>Tratamiento de imagen digital</a:t>
+            </a:r>
+          </a:p>
+          <a:p>
+            <a:pPr lvl="1"/>
+            <a:r>
+              <a:rPr lang="es-ES" dirty="0"/>
+              <a:t>Definición de imagen digital</a:t>
+            </a:r>
+          </a:p>
+          <a:p>
+            <a:pPr lvl="1"/>
+            <a:r>
+              <a:rPr lang="es-ES" dirty="0"/>
+              <a:t>Historia</a:t>
+            </a:r>
+          </a:p>
+          <a:p>
+            <a:pPr lvl="1"/>
+            <a:r>
+              <a:rPr lang="es-ES" dirty="0"/>
+              <a:t>Aplicaciones:</a:t>
+            </a:r>
+          </a:p>
+          <a:p>
+            <a:pPr lvl="2">
+              <a:buFont typeface="Arial" panose="020B0604020202020204" pitchFamily="34" charset="0"/>
+              <a:buChar char="•"/>
+            </a:pPr>
+            <a:r>
+              <a:rPr lang="es-ES" dirty="0"/>
+              <a:t>Medicina</a:t>
+            </a:r>
+          </a:p>
+          <a:p>
+            <a:pPr lvl="2">
+              <a:buFont typeface="Arial" panose="020B0604020202020204" pitchFamily="34" charset="0"/>
+              <a:buChar char="•"/>
+            </a:pPr>
+            <a:r>
+              <a:rPr lang="es-ES" dirty="0"/>
+              <a:t>Geografía</a:t>
+            </a:r>
+          </a:p>
+          <a:p>
+            <a:pPr lvl="2">
+              <a:buFont typeface="Arial" panose="020B0604020202020204" pitchFamily="34" charset="0"/>
+              <a:buChar char="•"/>
+            </a:pPr>
+            <a:r>
+              <a:rPr lang="es-ES" dirty="0"/>
+              <a:t>Visión artificial y robótica</a:t>
+            </a:r>
+          </a:p>
+          <a:p>
+            <a:pPr lvl="2">
+              <a:buFont typeface="Arial" panose="020B0604020202020204" pitchFamily="34" charset="0"/>
+              <a:buChar char="•"/>
+            </a:pPr>
+            <a:r>
+              <a:rPr lang="es-ES" dirty="0"/>
+              <a:t>Seguridad</a:t>
+            </a:r>
+          </a:p>
+          <a:p>
+            <a:pPr lvl="2">
+              <a:buFont typeface="Arial" panose="020B0604020202020204" pitchFamily="34" charset="0"/>
+              <a:buChar char="•"/>
+            </a:pPr>
+            <a:r>
+              <a:rPr lang="es-ES" dirty="0"/>
+              <a:t>Transmisión y codificación</a:t>
+            </a:r>
+          </a:p>
+        </p:txBody>
+      </p:sp>
+      <p:pic>
+        <p:nvPicPr>
+          <p:cNvPr id="1026" name="Picture 2" descr="Research in Medical Imaging Using Image Processing Techniques | IntechOpen">
+            <a:extLst>
+              <a:ext uri="{FF2B5EF4-FFF2-40B4-BE49-F238E27FC236}">
+                <a16:creationId xmlns:a16="http://schemas.microsoft.com/office/drawing/2014/main" id="{A018A05F-A6C4-4141-86A9-AF7E425A67B8}"/>
+              </a:ext>
+            </a:extLst>
+          </p:cNvPr>
+          <p:cNvPicPr>
+            <a:picLocks noChangeAspect="1" noChangeArrowheads="1"/>
+          </p:cNvPicPr>
+          <p:nvPr/>
+        </p:nvPicPr>
+        <p:blipFill>
+          <a:blip r:embed="rId2">
+            <a:extLst>
+              <a:ext uri="{28A0092B-C50C-407E-A947-70E740481C1C}">
+                <a14:useLocalDpi xmlns:a14="http://schemas.microsoft.com/office/drawing/2010/main" val="0"/>
+              </a:ext>
+            </a:extLst>
+          </a:blip>
+          <a:srcRect/>
+          <a:stretch>
+            <a:fillRect/>
+          </a:stretch>
+        </p:blipFill>
+        <p:spPr bwMode="auto">
+          <a:xfrm>
+            <a:off x="6807201" y="1505124"/>
+            <a:ext cx="4631418" cy="1648785"/>
+          </a:xfrm>
+          <a:prstGeom prst="rect">
+            <a:avLst/>
+          </a:prstGeom>
+          <a:noFill/>
+          <a:extLst>
+            <a:ext uri="{909E8E84-426E-40DD-AFC4-6F175D3DCCD1}">
+              <a14:hiddenFill xmlns:a14="http://schemas.microsoft.com/office/drawing/2010/main">
+                <a:solidFill>
+                  <a:srgbClr val="FFFFFF"/>
+                </a:solidFill>
+              </a14:hiddenFill>
+            </a:ext>
+          </a:extLst>
+        </p:spPr>
+      </p:pic>
+      <p:pic>
+        <p:nvPicPr>
+          <p:cNvPr id="1030" name="Picture 6" descr="Traffic Sign Classification with Keras and Deep Learning - PyImageSearch">
+            <a:extLst>
+              <a:ext uri="{FF2B5EF4-FFF2-40B4-BE49-F238E27FC236}">
+                <a16:creationId xmlns:a16="http://schemas.microsoft.com/office/drawing/2014/main" id="{06A859A1-DAE0-44BA-AB5D-FCD8CA756F09}"/>
+              </a:ext>
+            </a:extLst>
+          </p:cNvPr>
+          <p:cNvPicPr>
+            <a:picLocks noChangeAspect="1" noChangeArrowheads="1"/>
+          </p:cNvPicPr>
+          <p:nvPr/>
+        </p:nvPicPr>
+        <p:blipFill>
+          <a:blip r:embed="rId3">
+            <a:extLst>
+              <a:ext uri="{28A0092B-C50C-407E-A947-70E740481C1C}">
+                <a14:useLocalDpi xmlns:a14="http://schemas.microsoft.com/office/drawing/2010/main" val="0"/>
+              </a:ext>
+            </a:extLst>
+          </a:blip>
+          <a:srcRect/>
+          <a:stretch>
+            <a:fillRect/>
+          </a:stretch>
+        </p:blipFill>
+        <p:spPr bwMode="auto">
+          <a:xfrm>
+            <a:off x="7403449" y="3429000"/>
+            <a:ext cx="3652182" cy="2818267"/>
+          </a:xfrm>
+          <a:prstGeom prst="rect">
+            <a:avLst/>
+          </a:prstGeom>
+          <a:noFill/>
+          <a:extLst>
+            <a:ext uri="{909E8E84-426E-40DD-AFC4-6F175D3DCCD1}">
+              <a14:hiddenFill xmlns:a14="http://schemas.microsoft.com/office/drawing/2010/main">
+                <a:solidFill>
+                  <a:srgbClr val="FFFFFF"/>
+                </a:solidFill>
+              </a14:hiddenFill>
+            </a:ext>
+          </a:extLst>
+        </p:spPr>
+      </p:pic>
+    </p:spTree>
+    <p:extLst>
+      <p:ext uri="{BB962C8B-B14F-4D97-AF65-F5344CB8AC3E}">
+        <p14:creationId xmlns:p14="http://schemas.microsoft.com/office/powerpoint/2010/main" val="1381149067"/>
+      </p:ext>
+    </p:extLst>
+  </p:cSld>
+  <p:clrMapOvr>
+    <a:masterClrMapping/>
+  </p:clrMapOvr>
+</p:sld>
+</file>
+
+<file path=ppt/slides/slide4.xml><?xml version="1.0" encoding="utf-8"?>
+<p:sld xmlns:a="http://schemas.openxmlformats.org/drawingml/2006/main" xmlns:r="http://schemas.openxmlformats.org/officeDocument/2006/relationships" xmlns:p="http://schemas.openxmlformats.org/presentationml/2006/main">
+  <p:cSld>
+    <p:spTree>
+      <p:nvGrpSpPr>
+        <p:cNvPr id="1" name=""/>
+        <p:cNvGrpSpPr/>
+        <p:nvPr/>
+      </p:nvGrpSpPr>
+      <p:grpSpPr>
+        <a:xfrm>
+          <a:off x="0" y="0"/>
+          <a:ext cx="0" cy="0"/>
+          <a:chOff x="0" y="0"/>
+          <a:chExt cx="0" cy="0"/>
+        </a:xfrm>
+      </p:grpSpPr>
+      <p:sp>
+        <p:nvSpPr>
+          <p:cNvPr id="2" name="Título 1">
+            <a:extLst>
+              <a:ext uri="{FF2B5EF4-FFF2-40B4-BE49-F238E27FC236}">
+                <a16:creationId xmlns:a16="http://schemas.microsoft.com/office/drawing/2014/main" id="{400BE811-0EFD-49BA-9333-CEE8A9927691}"/>
+              </a:ext>
+            </a:extLst>
+          </p:cNvPr>
+          <p:cNvSpPr>
+            <a:spLocks noGrp="1"/>
+          </p:cNvSpPr>
+          <p:nvPr>
+            <p:ph type="title"/>
+          </p:nvPr>
+        </p:nvSpPr>
+        <p:spPr/>
+        <p:txBody>
+          <a:bodyPr/>
+          <a:lstStyle/>
+          <a:p>
+            <a:r>
+              <a:rPr lang="es-ES" dirty="0"/>
+              <a:t>Objetivos</a:t>
+            </a:r>
+          </a:p>
+        </p:txBody>
+      </p:sp>
+      <p:sp>
+        <p:nvSpPr>
+          <p:cNvPr id="3" name="Marcador de texto 2">
+            <a:extLst>
+              <a:ext uri="{FF2B5EF4-FFF2-40B4-BE49-F238E27FC236}">
+                <a16:creationId xmlns:a16="http://schemas.microsoft.com/office/drawing/2014/main" id="{EA763A67-AFFF-4A27-B3E9-BA3493949DE8}"/>
+              </a:ext>
+            </a:extLst>
+          </p:cNvPr>
+          <p:cNvSpPr>
+            <a:spLocks noGrp="1"/>
+          </p:cNvSpPr>
+          <p:nvPr>
             <p:ph type="body" idx="1"/>
           </p:nvPr>
         </p:nvSpPr>
@@ -18026,7 +20231,7 @@
           <a:p>
             <a:r>
               <a:rPr lang="es-ES" dirty="0"/>
-              <a:t>Tratamiento de imagen</a:t>
+              <a:t>Objetivos</a:t>
             </a:r>
           </a:p>
         </p:txBody>
@@ -18036,7 +20241,7 @@
           <p:cNvPr id="4" name="Marcador de contenido 3">
             <a:extLst>
               <a:ext uri="{FF2B5EF4-FFF2-40B4-BE49-F238E27FC236}">
-                <a16:creationId xmlns:a16="http://schemas.microsoft.com/office/drawing/2014/main" id="{9DCF5069-408F-4984-83CA-D162199A9B7D}"/>
+                <a16:creationId xmlns:a16="http://schemas.microsoft.com/office/drawing/2014/main" id="{F222A27C-ED0C-4719-B0D3-765CC6E5FB66}"/>
               </a:ext>
             </a:extLst>
           </p:cNvPr>
@@ -18052,7 +20257,53 @@
           <a:bodyPr/>
           <a:lstStyle/>
           <a:p>
-            <a:endParaRPr lang="es-ES" dirty="0"/>
+            <a:r>
+              <a:rPr lang="es-ES" dirty="0"/>
+              <a:t>Crear una versión de las prácticas de la asignatura de Tratamiento Digital de la Imagen en Python con enunciados en inglés</a:t>
+            </a:r>
+          </a:p>
+          <a:p>
+            <a:pPr marL="0" indent="0">
+              <a:buNone/>
+            </a:pPr>
+            <a:r>
+              <a:rPr lang="es-ES" dirty="0" err="1"/>
+              <a:t>Subojetivos</a:t>
+            </a:r>
+            <a:r>
+              <a:rPr lang="es-ES" dirty="0"/>
+              <a:t>:</a:t>
+            </a:r>
+          </a:p>
+          <a:p>
+            <a:pPr>
+              <a:buFont typeface="Arial" panose="020B0604020202020204" pitchFamily="34" charset="0"/>
+              <a:buChar char="•"/>
+            </a:pPr>
+            <a:r>
+              <a:rPr lang="es-ES" dirty="0"/>
+              <a:t>Migrar a Python</a:t>
+            </a:r>
+          </a:p>
+          <a:p>
+            <a:pPr>
+              <a:buFont typeface="Arial" panose="020B0604020202020204" pitchFamily="34" charset="0"/>
+              <a:buChar char="•"/>
+            </a:pPr>
+            <a:r>
+              <a:rPr lang="es-ES" dirty="0"/>
+              <a:t>Ampliar enunciados</a:t>
+            </a:r>
+          </a:p>
+          <a:p>
+            <a:pPr>
+              <a:buFont typeface="Arial" panose="020B0604020202020204" pitchFamily="34" charset="0"/>
+              <a:buChar char="•"/>
+            </a:pPr>
+            <a:r>
+              <a:rPr lang="es-ES" dirty="0"/>
+              <a:t>Traducir al inglés</a:t>
+            </a:r>
           </a:p>
         </p:txBody>
       </p:sp>
@@ -18061,7 +20312,7 @@
           <p:cNvPr id="5" name="Marcador de texto 4">
             <a:extLst>
               <a:ext uri="{FF2B5EF4-FFF2-40B4-BE49-F238E27FC236}">
-                <a16:creationId xmlns:a16="http://schemas.microsoft.com/office/drawing/2014/main" id="{4E350197-AF15-40E7-BF33-62FF0840265C}"/>
+                <a16:creationId xmlns:a16="http://schemas.microsoft.com/office/drawing/2014/main" id="{0E88C56F-5FAE-435C-9982-0DF4BA571F0F}"/>
               </a:ext>
             </a:extLst>
           </p:cNvPr>
@@ -18079,7 +20330,7 @@
           <a:p>
             <a:r>
               <a:rPr lang="es-ES" dirty="0"/>
-              <a:t>Educación</a:t>
+              <a:t>Metodología</a:t>
             </a:r>
           </a:p>
         </p:txBody>
@@ -18089,7 +20340,7 @@
           <p:cNvPr id="6" name="Marcador de contenido 5">
             <a:extLst>
               <a:ext uri="{FF2B5EF4-FFF2-40B4-BE49-F238E27FC236}">
-                <a16:creationId xmlns:a16="http://schemas.microsoft.com/office/drawing/2014/main" id="{6157FBF9-A8F2-4A57-A409-74F94DAAF28C}"/>
+                <a16:creationId xmlns:a16="http://schemas.microsoft.com/office/drawing/2014/main" id="{2E4F8F2D-7CB1-4910-AD10-C0F6B3F44309}"/>
               </a:ext>
             </a:extLst>
           </p:cNvPr>
@@ -18105,14 +20356,53 @@
           <a:bodyPr/>
           <a:lstStyle/>
           <a:p>
-            <a:endParaRPr lang="es-ES"/>
+            <a:r>
+              <a:rPr lang="es-ES" dirty="0"/>
+              <a:t>Repaso de teoría</a:t>
+            </a:r>
+          </a:p>
+          <a:p>
+            <a:r>
+              <a:rPr lang="es-ES" dirty="0"/>
+              <a:t>Análisis de práctica original</a:t>
+            </a:r>
+          </a:p>
+          <a:p>
+            <a:r>
+              <a:rPr lang="es-ES" dirty="0"/>
+              <a:t>Crear cuadernillo y dividir práctica</a:t>
+            </a:r>
+          </a:p>
+          <a:p>
+            <a:r>
+              <a:rPr lang="es-ES" dirty="0"/>
+              <a:t>Código en Python</a:t>
+            </a:r>
+          </a:p>
+          <a:p>
+            <a:r>
+              <a:rPr lang="es-ES" dirty="0"/>
+              <a:t>Comprobación de resultados</a:t>
+            </a:r>
+          </a:p>
+          <a:p>
+            <a:r>
+              <a:rPr lang="es-ES" dirty="0"/>
+              <a:t>Realizar enunciado</a:t>
+            </a:r>
+          </a:p>
+          <a:p>
+            <a:endParaRPr lang="es-ES" dirty="0"/>
+          </a:p>
+          <a:p>
+            <a:endParaRPr lang="es-ES" dirty="0"/>
           </a:p>
         </p:txBody>
       </p:sp>
     </p:spTree>
     <p:extLst>
       <p:ext uri="{BB962C8B-B14F-4D97-AF65-F5344CB8AC3E}">
-        <p14:creationId xmlns:p14="http://schemas.microsoft.com/office/powerpoint/2010/main" val="1381149067"/>
+        <p14:creationId xmlns:p14="http://schemas.microsoft.com/office/powerpoint/2010/main" val="1204689060"/>
       </p:ext>
     </p:extLst>
   </p:cSld>
@@ -18122,7 +20412,7 @@
 </p:sld>
 </file>
 
-<file path=ppt/slides/slide4.xml><?xml version="1.0" encoding="utf-8"?>
+<file path=ppt/slides/slide5.xml><?xml version="1.0" encoding="utf-8"?>
 <p:sld xmlns:a="http://schemas.openxmlformats.org/drawingml/2006/main" xmlns:r="http://schemas.openxmlformats.org/officeDocument/2006/relationships" xmlns:p="http://schemas.openxmlformats.org/presentationml/2006/main">
   <p:cSld>
     <p:spTree>
@@ -18568,7 +20858,7 @@
 </p:sld>
 </file>
 
-<file path=ppt/slides/slide5.xml><?xml version="1.0" encoding="utf-8"?>
+<file path=ppt/slides/slide6.xml><?xml version="1.0" encoding="utf-8"?>
 <p:sld xmlns:a="http://schemas.openxmlformats.org/drawingml/2006/main" xmlns:r="http://schemas.openxmlformats.org/officeDocument/2006/relationships" xmlns:p="http://schemas.openxmlformats.org/presentationml/2006/main">
   <p:cSld>
     <p:spTree>
@@ -18686,7 +20976,7 @@
 </p:sld>
 </file>
 
-<file path=ppt/slides/slide6.xml><?xml version="1.0" encoding="utf-8"?>
+<file path=ppt/slides/slide7.xml><?xml version="1.0" encoding="utf-8"?>
 <p:sld xmlns:a="http://schemas.openxmlformats.org/drawingml/2006/main" xmlns:r="http://schemas.openxmlformats.org/officeDocument/2006/relationships" xmlns:p="http://schemas.openxmlformats.org/presentationml/2006/main">
   <p:cSld>
     <p:spTree>
@@ -18965,7 +21255,7 @@
 </p:sld>
 </file>
 
-<file path=ppt/slides/slide7.xml><?xml version="1.0" encoding="utf-8"?>
+<file path=ppt/slides/slide8.xml><?xml version="1.0" encoding="utf-8"?>
 <p:sld xmlns:a="http://schemas.openxmlformats.org/drawingml/2006/main" xmlns:r="http://schemas.openxmlformats.org/officeDocument/2006/relationships" xmlns:p="http://schemas.openxmlformats.org/presentationml/2006/main">
   <p:cSld>
     <p:spTree>
@@ -19004,9 +21294,10 @@
           <a:lstStyle/>
           <a:p>
             <a:r>
-              <a:rPr lang="es-ES" dirty="0"/>
+              <a:rPr lang="es-ES"/>
               <a:t>Prácticas en Python</a:t>
             </a:r>
+            <a:endParaRPr lang="es-ES" dirty="0"/>
           </a:p>
         </p:txBody>
       </p:sp>
@@ -19031,25 +21322,47 @@
           <a:bodyPr/>
           <a:lstStyle/>
           <a:p>
-            <a:r>
-              <a:rPr lang="es-ES" dirty="0"/>
+            <a:pPr>
+              <a:lnSpc>
+                <a:spcPct val="150000"/>
+              </a:lnSpc>
+            </a:pPr>
+            <a:r>
+              <a:rPr lang="es-ES" sz="2400" dirty="0"/>
               <a:t>Ampliación de los enunciados</a:t>
             </a:r>
           </a:p>
           <a:p>
-            <a:r>
-              <a:rPr lang="es-ES" dirty="0"/>
+            <a:pPr>
+              <a:lnSpc>
+                <a:spcPct val="150000"/>
+              </a:lnSpc>
+            </a:pPr>
+            <a:r>
+              <a:rPr lang="es-ES" sz="2400" dirty="0"/>
               <a:t>Traducción al inglés</a:t>
             </a:r>
           </a:p>
           <a:p>
-            <a:r>
-              <a:rPr lang="es-ES" dirty="0"/>
-              <a:t>Cambios en las </a:t>
-            </a:r>
-            <a:r>
-              <a:rPr lang="es-ES"/>
-              <a:t>imágenes utilizadas</a:t>
+            <a:pPr>
+              <a:lnSpc>
+                <a:spcPct val="150000"/>
+              </a:lnSpc>
+            </a:pPr>
+            <a:r>
+              <a:rPr lang="es-ES" sz="2400" dirty="0"/>
+              <a:t>Cambios en las imágenes utilizadas</a:t>
+            </a:r>
+          </a:p>
+          <a:p>
+            <a:pPr>
+              <a:lnSpc>
+                <a:spcPct val="150000"/>
+              </a:lnSpc>
+            </a:pPr>
+            <a:r>
+              <a:rPr lang="es-ES" sz="2400" dirty="0"/>
+              <a:t>Guía de instalación</a:t>
             </a:r>
           </a:p>
           <a:p>
@@ -19061,6 +21374,173 @@
     <p:extLst>
       <p:ext uri="{BB962C8B-B14F-4D97-AF65-F5344CB8AC3E}">
         <p14:creationId xmlns:p14="http://schemas.microsoft.com/office/powerpoint/2010/main" val="3444179828"/>
+      </p:ext>
+    </p:extLst>
+  </p:cSld>
+  <p:clrMapOvr>
+    <a:masterClrMapping/>
+  </p:clrMapOvr>
+</p:sld>
+</file>
+
+<file path=ppt/slides/slide9.xml><?xml version="1.0" encoding="utf-8"?>
+<p:sld xmlns:a="http://schemas.openxmlformats.org/drawingml/2006/main" xmlns:r="http://schemas.openxmlformats.org/officeDocument/2006/relationships" xmlns:p="http://schemas.openxmlformats.org/presentationml/2006/main">
+  <p:cSld>
+    <p:spTree>
+      <p:nvGrpSpPr>
+        <p:cNvPr id="1" name=""/>
+        <p:cNvGrpSpPr/>
+        <p:nvPr/>
+      </p:nvGrpSpPr>
+      <p:grpSpPr>
+        <a:xfrm>
+          <a:off x="0" y="0"/>
+          <a:ext cx="0" cy="0"/>
+          <a:chOff x="0" y="0"/>
+          <a:chExt cx="0" cy="0"/>
+        </a:xfrm>
+      </p:grpSpPr>
+      <p:sp>
+        <p:nvSpPr>
+          <p:cNvPr id="2" name="Título 1">
+            <a:extLst>
+              <a:ext uri="{FF2B5EF4-FFF2-40B4-BE49-F238E27FC236}">
+                <a16:creationId xmlns:a16="http://schemas.microsoft.com/office/drawing/2014/main" id="{116618D3-D2EF-4FC8-8702-171ECAFBD324}"/>
+              </a:ext>
+            </a:extLst>
+          </p:cNvPr>
+          <p:cNvSpPr>
+            <a:spLocks noGrp="1"/>
+          </p:cNvSpPr>
+          <p:nvPr>
+            <p:ph type="title"/>
+          </p:nvPr>
+        </p:nvSpPr>
+        <p:spPr/>
+        <p:txBody>
+          <a:bodyPr/>
+          <a:lstStyle/>
+          <a:p>
+            <a:r>
+              <a:rPr lang="es-ES" dirty="0"/>
+              <a:t>Ejemplo: Práctica 5</a:t>
+            </a:r>
+          </a:p>
+        </p:txBody>
+      </p:sp>
+      <p:sp>
+        <p:nvSpPr>
+          <p:cNvPr id="3" name="Marcador de contenido 2">
+            <a:extLst>
+              <a:ext uri="{FF2B5EF4-FFF2-40B4-BE49-F238E27FC236}">
+                <a16:creationId xmlns:a16="http://schemas.microsoft.com/office/drawing/2014/main" id="{42041CEB-985C-4C4C-9024-F35DC7CFAED7}"/>
+              </a:ext>
+            </a:extLst>
+          </p:cNvPr>
+          <p:cNvSpPr>
+            <a:spLocks noGrp="1"/>
+          </p:cNvSpPr>
+          <p:nvPr>
+            <p:ph idx="1"/>
+          </p:nvPr>
+        </p:nvSpPr>
+        <p:spPr>
+          <a:xfrm>
+            <a:off x="1154955" y="2603500"/>
+            <a:ext cx="4941046" cy="3416300"/>
+          </a:xfrm>
+        </p:spPr>
+        <p:txBody>
+          <a:bodyPr/>
+          <a:lstStyle/>
+          <a:p>
+            <a:r>
+              <a:rPr lang="es-ES" dirty="0"/>
+              <a:t>Objetivo de la práctica: segmentar el cuerpo del cormorán en la imagen usando K-medias</a:t>
+            </a:r>
+          </a:p>
+          <a:p>
+            <a:r>
+              <a:rPr lang="es-ES" dirty="0"/>
+              <a:t>Sistema de ensayo y error</a:t>
+            </a:r>
+          </a:p>
+          <a:p>
+            <a:r>
+              <a:rPr lang="es-ES" dirty="0"/>
+              <a:t>4 apartados:</a:t>
+            </a:r>
+          </a:p>
+          <a:p>
+            <a:pPr lvl="1"/>
+            <a:r>
+              <a:rPr lang="es-ES" dirty="0"/>
+              <a:t>RGB</a:t>
+            </a:r>
+          </a:p>
+          <a:p>
+            <a:pPr lvl="1"/>
+            <a:r>
+              <a:rPr lang="es-ES" dirty="0"/>
+              <a:t>LAB</a:t>
+            </a:r>
+          </a:p>
+          <a:p>
+            <a:pPr lvl="1"/>
+            <a:r>
+              <a:rPr lang="es-ES" dirty="0"/>
+              <a:t>Filtro de textura</a:t>
+            </a:r>
+          </a:p>
+          <a:p>
+            <a:pPr lvl="1"/>
+            <a:r>
+              <a:rPr lang="es-ES" dirty="0"/>
+              <a:t>Mixto</a:t>
+            </a:r>
+          </a:p>
+        </p:txBody>
+      </p:sp>
+      <p:pic>
+        <p:nvPicPr>
+          <p:cNvPr id="5" name="Imagen 4" descr="Ave parado en un cuerpo de agua&#10;&#10;Descripción generada automáticamente">
+            <a:extLst>
+              <a:ext uri="{FF2B5EF4-FFF2-40B4-BE49-F238E27FC236}">
+                <a16:creationId xmlns:a16="http://schemas.microsoft.com/office/drawing/2014/main" id="{F1E6920F-28F3-4967-8599-2A293653AC9C}"/>
+              </a:ext>
+            </a:extLst>
+          </p:cNvPr>
+          <p:cNvPicPr>
+            <a:picLocks noChangeAspect="1"/>
+          </p:cNvPicPr>
+          <p:nvPr/>
+        </p:nvPicPr>
+        <p:blipFill>
+          <a:blip r:embed="rId2">
+            <a:extLst>
+              <a:ext uri="{28A0092B-C50C-407E-A947-70E740481C1C}">
+                <a14:useLocalDpi xmlns:a14="http://schemas.microsoft.com/office/drawing/2010/main" val="0"/>
+              </a:ext>
+            </a:extLst>
+          </a:blip>
+          <a:stretch>
+            <a:fillRect/>
+          </a:stretch>
+        </p:blipFill>
+        <p:spPr>
+          <a:xfrm>
+            <a:off x="7377519" y="2585357"/>
+            <a:ext cx="3434443" cy="3434443"/>
+          </a:xfrm>
+          <a:prstGeom prst="rect">
+            <a:avLst/>
+          </a:prstGeom>
+        </p:spPr>
+      </p:pic>
+    </p:spTree>
+    <p:extLst>
+      <p:ext uri="{BB962C8B-B14F-4D97-AF65-F5344CB8AC3E}">
+        <p14:creationId xmlns:p14="http://schemas.microsoft.com/office/powerpoint/2010/main" val="2343070133"/>
       </p:ext>
     </p:extLst>
   </p:cSld>

</xml_diff>